<commit_message>
Updates to power point versions of persentations
</commit_message>
<xml_diff>
--- a/Files/Metadata_Groupings/Benefits.pptx
+++ b/Files/Metadata_Groupings/Benefits.pptx
@@ -2,15 +2,15 @@
 <file path=ppt/presentation.xml><?xml version="1.0" encoding="utf-8"?>
 <p:presentation xmlns:a="http://schemas.openxmlformats.org/drawingml/2006/main" xmlns:r="http://schemas.openxmlformats.org/officeDocument/2006/relationships" xmlns:p="http://schemas.openxmlformats.org/presentationml/2006/main">
   <p:sldMasterIdLst>
-    <p:sldMasterId id="2147483648" r:id="rId5"/>
+    <p:sldMasterId id="2147483648" r:id="rId1"/>
   </p:sldMasterIdLst>
   <p:notesMasterIdLst>
-    <p:notesMasterId r:id="rId7"/>
+    <p:notesMasterId r:id="rId5"/>
   </p:notesMasterIdLst>
   <p:sldIdLst>
-    <p:sldId id="256" r:id="rId8"/>
-    <p:sldId id="257" r:id="rId9"/>
-    <p:sldId id="258" r:id="rId10"/>
+    <p:sldId id="256" r:id="rId2"/>
+    <p:sldId id="257" r:id="rId3"/>
+    <p:sldId id="258" r:id="rId4"/>
   </p:sldIdLst>
   <p:sldSz cx="13004800" cy="9753600"/>
   <p:notesSz cx="6858000" cy="9144000"/>
@@ -30,7 +30,7 @@
       <a:buFontTx/>
       <a:buNone/>
       <a:tabLst/>
-      <a:defRPr b="0" baseline="0" cap="none" i="0" spc="0" strike="noStrike" sz="1800" u="none" kumimoji="0" normalizeH="0">
+      <a:defRPr kumimoji="0" sz="1800" b="0" i="0" u="none" strike="noStrike" cap="none" spc="0" normalizeH="0" baseline="0">
         <a:ln>
           <a:noFill/>
         </a:ln>
@@ -56,7 +56,7 @@
       <a:buFontTx/>
       <a:buNone/>
       <a:tabLst/>
-      <a:defRPr b="1" baseline="0" cap="none" i="0" spc="0" strike="noStrike" sz="2400" u="none" kumimoji="0" normalizeH="0">
+      <a:defRPr kumimoji="0" sz="2400" b="1" i="0" u="none" strike="noStrike" cap="none" spc="0" normalizeH="0" baseline="0">
         <a:ln>
           <a:noFill/>
         </a:ln>
@@ -86,7 +86,7 @@
       <a:buFontTx/>
       <a:buNone/>
       <a:tabLst/>
-      <a:defRPr b="1" baseline="0" cap="none" i="0" spc="0" strike="noStrike" sz="2400" u="none" kumimoji="0" normalizeH="0">
+      <a:defRPr kumimoji="0" sz="2400" b="1" i="0" u="none" strike="noStrike" cap="none" spc="0" normalizeH="0" baseline="0">
         <a:ln>
           <a:noFill/>
         </a:ln>
@@ -116,7 +116,7 @@
       <a:buFontTx/>
       <a:buNone/>
       <a:tabLst/>
-      <a:defRPr b="1" baseline="0" cap="none" i="0" spc="0" strike="noStrike" sz="2400" u="none" kumimoji="0" normalizeH="0">
+      <a:defRPr kumimoji="0" sz="2400" b="1" i="0" u="none" strike="noStrike" cap="none" spc="0" normalizeH="0" baseline="0">
         <a:ln>
           <a:noFill/>
         </a:ln>
@@ -146,7 +146,7 @@
       <a:buFontTx/>
       <a:buNone/>
       <a:tabLst/>
-      <a:defRPr b="1" baseline="0" cap="none" i="0" spc="0" strike="noStrike" sz="2400" u="none" kumimoji="0" normalizeH="0">
+      <a:defRPr kumimoji="0" sz="2400" b="1" i="0" u="none" strike="noStrike" cap="none" spc="0" normalizeH="0" baseline="0">
         <a:ln>
           <a:noFill/>
         </a:ln>
@@ -176,7 +176,7 @@
       <a:buFontTx/>
       <a:buNone/>
       <a:tabLst/>
-      <a:defRPr b="1" baseline="0" cap="none" i="0" spc="0" strike="noStrike" sz="2400" u="none" kumimoji="0" normalizeH="0">
+      <a:defRPr kumimoji="0" sz="2400" b="1" i="0" u="none" strike="noStrike" cap="none" spc="0" normalizeH="0" baseline="0">
         <a:ln>
           <a:noFill/>
         </a:ln>
@@ -206,7 +206,7 @@
       <a:buFontTx/>
       <a:buNone/>
       <a:tabLst/>
-      <a:defRPr b="1" baseline="0" cap="none" i="0" spc="0" strike="noStrike" sz="2400" u="none" kumimoji="0" normalizeH="0">
+      <a:defRPr kumimoji="0" sz="2400" b="1" i="0" u="none" strike="noStrike" cap="none" spc="0" normalizeH="0" baseline="0">
         <a:ln>
           <a:noFill/>
         </a:ln>
@@ -236,7 +236,7 @@
       <a:buFontTx/>
       <a:buNone/>
       <a:tabLst/>
-      <a:defRPr b="1" baseline="0" cap="none" i="0" spc="0" strike="noStrike" sz="2400" u="none" kumimoji="0" normalizeH="0">
+      <a:defRPr kumimoji="0" sz="2400" b="1" i="0" u="none" strike="noStrike" cap="none" spc="0" normalizeH="0" baseline="0">
         <a:ln>
           <a:noFill/>
         </a:ln>
@@ -266,7 +266,7 @@
       <a:buFontTx/>
       <a:buNone/>
       <a:tabLst/>
-      <a:defRPr b="1" baseline="0" cap="none" i="0" spc="0" strike="noStrike" sz="2400" u="none" kumimoji="0" normalizeH="0">
+      <a:defRPr kumimoji="0" sz="2400" b="1" i="0" u="none" strike="noStrike" cap="none" spc="0" normalizeH="0" baseline="0">
         <a:ln>
           <a:noFill/>
         </a:ln>
@@ -296,7 +296,7 @@
       <a:buFontTx/>
       <a:buNone/>
       <a:tabLst/>
-      <a:defRPr b="1" baseline="0" cap="none" i="0" spc="0" strike="noStrike" sz="2400" u="none" kumimoji="0" normalizeH="0">
+      <a:defRPr kumimoji="0" sz="2400" b="1" i="0" u="none" strike="noStrike" cap="none" spc="0" normalizeH="0" baseline="0">
         <a:ln>
           <a:noFill/>
         </a:ln>
@@ -315,13 +315,14 @@
 </p:presentation>
 </file>
 
-<file path=ppt/commentAuthors.xml><?xml version="1.0" encoding="utf-8"?>
-<p:cmAuthorLst xmlns:a="http://schemas.openxmlformats.org/drawingml/2006/main" xmlns:r="http://schemas.openxmlformats.org/officeDocument/2006/relationships" xmlns:p="http://schemas.openxmlformats.org/presentationml/2006/main"/>
-</file>
-
 <file path=ppt/notesMasters/notesMaster1.xml><?xml version="1.0" encoding="utf-8"?>
 <p:notesMaster xmlns:a="http://schemas.openxmlformats.org/drawingml/2006/main" xmlns:r="http://schemas.openxmlformats.org/officeDocument/2006/relationships" xmlns:p="http://schemas.openxmlformats.org/presentationml/2006/main">
   <p:cSld>
+    <p:bg>
+      <p:bgRef idx="1001">
+        <a:schemeClr val="bg1"/>
+      </p:bgRef>
+    </p:bg>
     <p:spTree>
       <p:nvGrpSpPr>
         <p:cNvPr id="1" name=""/>
@@ -339,7 +340,9 @@
       <p:sp>
         <p:nvSpPr>
           <p:cNvPr id="116" name="Shape 116"/>
-          <p:cNvSpPr/>
+          <p:cNvSpPr>
+            <a:spLocks noGrp="1" noRot="1" noChangeAspect="1"/>
+          </p:cNvSpPr>
           <p:nvPr>
             <p:ph type="sldImg"/>
           </p:nvPr>
@@ -357,14 +360,16 @@
           <a:bodyPr/>
           <a:lstStyle/>
           <a:p>
-            <a:pPr/>
+            <a:endParaRPr/>
           </a:p>
         </p:txBody>
       </p:sp>
       <p:sp>
         <p:nvSpPr>
           <p:cNvPr id="117" name="Shape 117"/>
-          <p:cNvSpPr/>
+          <p:cNvSpPr>
+            <a:spLocks noGrp="1"/>
+          </p:cNvSpPr>
           <p:nvPr>
             <p:ph type="body" sz="quarter" idx="1"/>
           </p:nvPr>
@@ -382,7 +387,7 @@
           <a:bodyPr/>
           <a:lstStyle/>
           <a:p>
-            <a:pPr/>
+            <a:endParaRPr/>
           </a:p>
         </p:txBody>
       </p:sp>
@@ -494,7 +499,7 @@
 </file>
 
 <file path=ppt/slideLayouts/slideLayout1.xml><?xml version="1.0" encoding="utf-8"?>
-<p:sldLayout xmlns:a="http://schemas.openxmlformats.org/drawingml/2006/main" xmlns:r="http://schemas.openxmlformats.org/officeDocument/2006/relationships" xmlns:p="http://schemas.openxmlformats.org/presentationml/2006/main" type="title" showMasterSp="1" showMasterPhAnim="1">
+<p:sldLayout xmlns:a="http://schemas.openxmlformats.org/drawingml/2006/main" xmlns:r="http://schemas.openxmlformats.org/officeDocument/2006/relationships" xmlns:p="http://schemas.openxmlformats.org/presentationml/2006/main" type="title">
   <p:cSld name="Title &amp; Subtitle">
     <p:spTree>
       <p:nvGrpSpPr>
@@ -513,7 +518,9 @@
       <p:sp>
         <p:nvSpPr>
           <p:cNvPr id="11" name="Title Text"/>
-          <p:cNvSpPr txBox="1"/>
+          <p:cNvSpPr txBox="1">
+            <a:spLocks noGrp="1"/>
+          </p:cNvSpPr>
           <p:nvPr>
             <p:ph type="title"/>
           </p:nvPr>
@@ -531,7 +538,6 @@
           <a:bodyPr anchor="b"/>
           <a:lstStyle/>
           <a:p>
-            <a:pPr/>
             <a:r>
               <a:t>Title Text</a:t>
             </a:r>
@@ -541,7 +547,9 @@
       <p:sp>
         <p:nvSpPr>
           <p:cNvPr id="12" name="Body Level One…"/>
-          <p:cNvSpPr txBox="1"/>
+          <p:cNvSpPr txBox="1">
+            <a:spLocks noGrp="1"/>
+          </p:cNvSpPr>
           <p:nvPr>
             <p:ph type="body" sz="quarter" idx="1"/>
           </p:nvPr>
@@ -600,7 +608,6 @@
             </a:lvl5pPr>
           </a:lstStyle>
           <a:p>
-            <a:pPr/>
             <a:r>
               <a:t>Body Level One</a:t>
             </a:r>
@@ -634,7 +641,9 @@
       <p:sp>
         <p:nvSpPr>
           <p:cNvPr id="13" name="Slide Number"/>
-          <p:cNvSpPr txBox="1"/>
+          <p:cNvSpPr txBox="1">
+            <a:spLocks noGrp="1"/>
+          </p:cNvSpPr>
           <p:nvPr>
             <p:ph type="sldNum" sz="quarter" idx="2"/>
           </p:nvPr>
@@ -657,8 +666,10 @@
             </a:lvl1pPr>
           </a:lstStyle>
           <a:p>
-            <a:pPr/>
-            <a:fld id="{86CB4B4D-7CA3-9044-876B-883B54F8677D}" type="slidenum"/>
+            <a:fld id="{86CB4B4D-7CA3-9044-876B-883B54F8677D}" type="slidenum">
+              <a:t>‹#›</a:t>
+            </a:fld>
+            <a:endParaRPr/>
           </a:p>
         </p:txBody>
       </p:sp>
@@ -667,12 +678,12 @@
   <p:clrMapOvr>
     <a:masterClrMapping/>
   </p:clrMapOvr>
-  <p:transition xmlns:p14="http://schemas.microsoft.com/office/powerpoint/2010/main" spd="med" advClick="1"/>
+  <p:transition spd="med"/>
 </p:sldLayout>
 </file>
 
 <file path=ppt/slideLayouts/slideLayout10.xml><?xml version="1.0" encoding="utf-8"?>
-<p:sldLayout xmlns:a="http://schemas.openxmlformats.org/drawingml/2006/main" xmlns:r="http://schemas.openxmlformats.org/officeDocument/2006/relationships" xmlns:p="http://schemas.openxmlformats.org/presentationml/2006/main" type="tx" showMasterSp="1" showMasterPhAnim="1">
+<p:sldLayout xmlns:a="http://schemas.openxmlformats.org/drawingml/2006/main" xmlns:r="http://schemas.openxmlformats.org/officeDocument/2006/relationships" xmlns:p="http://schemas.openxmlformats.org/presentationml/2006/main" type="tx">
   <p:cSld name="Quote">
     <p:spTree>
       <p:nvGrpSpPr>
@@ -691,7 +702,9 @@
       <p:sp>
         <p:nvSpPr>
           <p:cNvPr id="93" name="–Johnny Appleseed"/>
-          <p:cNvSpPr txBox="1"/>
+          <p:cNvSpPr txBox="1">
+            <a:spLocks noGrp="1"/>
+          </p:cNvSpPr>
           <p:nvPr>
             <p:ph type="body" sz="quarter" idx="13"/>
           </p:nvPr>
@@ -716,11 +729,10 @@
               </a:spcBef>
               <a:buSzTx/>
               <a:buNone/>
-              <a:defRPr i="1" sz="2400"/>
+              <a:defRPr sz="2400" i="1"/>
             </a:lvl1pPr>
           </a:lstStyle>
           <a:p>
-            <a:pPr/>
             <a:r>
               <a:t>–Johnny Appleseed</a:t>
             </a:r>
@@ -730,7 +742,9 @@
       <p:sp>
         <p:nvSpPr>
           <p:cNvPr id="94" name="“Type a quote here.”"/>
-          <p:cNvSpPr txBox="1"/>
+          <p:cNvSpPr txBox="1">
+            <a:spLocks noGrp="1"/>
+          </p:cNvSpPr>
           <p:nvPr>
             <p:ph type="body" sz="quarter" idx="14"/>
           </p:nvPr>
@@ -764,7 +778,6 @@
             </a:lvl1pPr>
           </a:lstStyle>
           <a:p>
-            <a:pPr/>
             <a:r>
               <a:t>“Type a quote here.” </a:t>
             </a:r>
@@ -774,7 +787,9 @@
       <p:sp>
         <p:nvSpPr>
           <p:cNvPr id="95" name="Slide Number"/>
-          <p:cNvSpPr txBox="1"/>
+          <p:cNvSpPr txBox="1">
+            <a:spLocks noGrp="1"/>
+          </p:cNvSpPr>
           <p:nvPr>
             <p:ph type="sldNum" sz="quarter" idx="2"/>
           </p:nvPr>
@@ -788,8 +803,10 @@
           <a:bodyPr/>
           <a:lstStyle/>
           <a:p>
-            <a:pPr/>
-            <a:fld id="{86CB4B4D-7CA3-9044-876B-883B54F8677D}" type="slidenum"/>
+            <a:fld id="{86CB4B4D-7CA3-9044-876B-883B54F8677D}" type="slidenum">
+              <a:t>‹#›</a:t>
+            </a:fld>
+            <a:endParaRPr/>
           </a:p>
         </p:txBody>
       </p:sp>
@@ -798,12 +815,12 @@
   <p:clrMapOvr>
     <a:masterClrMapping/>
   </p:clrMapOvr>
-  <p:transition xmlns:p14="http://schemas.microsoft.com/office/powerpoint/2010/main" spd="med" advClick="1"/>
+  <p:transition spd="med"/>
 </p:sldLayout>
 </file>
 
 <file path=ppt/slideLayouts/slideLayout11.xml><?xml version="1.0" encoding="utf-8"?>
-<p:sldLayout xmlns:a="http://schemas.openxmlformats.org/drawingml/2006/main" xmlns:r="http://schemas.openxmlformats.org/officeDocument/2006/relationships" xmlns:p="http://schemas.openxmlformats.org/presentationml/2006/main" type="tx" showMasterSp="1" showMasterPhAnim="1">
+<p:sldLayout xmlns:a="http://schemas.openxmlformats.org/drawingml/2006/main" xmlns:r="http://schemas.openxmlformats.org/officeDocument/2006/relationships" xmlns:p="http://schemas.openxmlformats.org/presentationml/2006/main" type="tx">
   <p:cSld name="Photo">
     <p:spTree>
       <p:nvGrpSpPr>
@@ -822,7 +839,9 @@
       <p:sp>
         <p:nvSpPr>
           <p:cNvPr id="102" name="Image"/>
-          <p:cNvSpPr/>
+          <p:cNvSpPr>
+            <a:spLocks noGrp="1"/>
+          </p:cNvSpPr>
           <p:nvPr>
             <p:ph type="pic" idx="13"/>
           </p:nvPr>
@@ -842,14 +861,16 @@
           </a:bodyPr>
           <a:lstStyle/>
           <a:p>
-            <a:pPr/>
+            <a:endParaRPr/>
           </a:p>
         </p:txBody>
       </p:sp>
       <p:sp>
         <p:nvSpPr>
           <p:cNvPr id="103" name="Slide Number"/>
-          <p:cNvSpPr txBox="1"/>
+          <p:cNvSpPr txBox="1">
+            <a:spLocks noGrp="1"/>
+          </p:cNvSpPr>
           <p:nvPr>
             <p:ph type="sldNum" sz="quarter" idx="2"/>
           </p:nvPr>
@@ -863,8 +884,10 @@
           <a:bodyPr/>
           <a:lstStyle/>
           <a:p>
-            <a:pPr/>
-            <a:fld id="{86CB4B4D-7CA3-9044-876B-883B54F8677D}" type="slidenum"/>
+            <a:fld id="{86CB4B4D-7CA3-9044-876B-883B54F8677D}" type="slidenum">
+              <a:t>‹#›</a:t>
+            </a:fld>
+            <a:endParaRPr/>
           </a:p>
         </p:txBody>
       </p:sp>
@@ -873,12 +896,12 @@
   <p:clrMapOvr>
     <a:masterClrMapping/>
   </p:clrMapOvr>
-  <p:transition xmlns:p14="http://schemas.microsoft.com/office/powerpoint/2010/main" spd="med" advClick="1"/>
+  <p:transition spd="med"/>
 </p:sldLayout>
 </file>
 
 <file path=ppt/slideLayouts/slideLayout12.xml><?xml version="1.0" encoding="utf-8"?>
-<p:sldLayout xmlns:a="http://schemas.openxmlformats.org/drawingml/2006/main" xmlns:r="http://schemas.openxmlformats.org/officeDocument/2006/relationships" xmlns:p="http://schemas.openxmlformats.org/presentationml/2006/main" type="tx" showMasterSp="1" showMasterPhAnim="1">
+<p:sldLayout xmlns:a="http://schemas.openxmlformats.org/drawingml/2006/main" xmlns:r="http://schemas.openxmlformats.org/officeDocument/2006/relationships" xmlns:p="http://schemas.openxmlformats.org/presentationml/2006/main" type="tx">
   <p:cSld name="Blank">
     <p:spTree>
       <p:nvGrpSpPr>
@@ -897,7 +920,9 @@
       <p:sp>
         <p:nvSpPr>
           <p:cNvPr id="110" name="Slide Number"/>
-          <p:cNvSpPr txBox="1"/>
+          <p:cNvSpPr txBox="1">
+            <a:spLocks noGrp="1"/>
+          </p:cNvSpPr>
           <p:nvPr>
             <p:ph type="sldNum" sz="quarter" idx="2"/>
           </p:nvPr>
@@ -911,8 +936,10 @@
           <a:bodyPr/>
           <a:lstStyle/>
           <a:p>
-            <a:pPr/>
-            <a:fld id="{86CB4B4D-7CA3-9044-876B-883B54F8677D}" type="slidenum"/>
+            <a:fld id="{86CB4B4D-7CA3-9044-876B-883B54F8677D}" type="slidenum">
+              <a:t>‹#›</a:t>
+            </a:fld>
+            <a:endParaRPr/>
           </a:p>
         </p:txBody>
       </p:sp>
@@ -921,12 +948,12 @@
   <p:clrMapOvr>
     <a:masterClrMapping/>
   </p:clrMapOvr>
-  <p:transition xmlns:p14="http://schemas.microsoft.com/office/powerpoint/2010/main" spd="med" advClick="1"/>
+  <p:transition spd="med"/>
 </p:sldLayout>
 </file>
 
 <file path=ppt/slideLayouts/slideLayout2.xml><?xml version="1.0" encoding="utf-8"?>
-<p:sldLayout xmlns:a="http://schemas.openxmlformats.org/drawingml/2006/main" xmlns:r="http://schemas.openxmlformats.org/officeDocument/2006/relationships" xmlns:p="http://schemas.openxmlformats.org/presentationml/2006/main" type="tx" showMasterSp="1" showMasterPhAnim="1">
+<p:sldLayout xmlns:a="http://schemas.openxmlformats.org/drawingml/2006/main" xmlns:r="http://schemas.openxmlformats.org/officeDocument/2006/relationships" xmlns:p="http://schemas.openxmlformats.org/presentationml/2006/main" type="tx">
   <p:cSld name="Photo - Horizontal">
     <p:spTree>
       <p:nvGrpSpPr>
@@ -945,7 +972,9 @@
       <p:sp>
         <p:nvSpPr>
           <p:cNvPr id="20" name="Image"/>
-          <p:cNvSpPr/>
+          <p:cNvSpPr>
+            <a:spLocks noGrp="1"/>
+          </p:cNvSpPr>
           <p:nvPr>
             <p:ph type="pic" idx="13"/>
           </p:nvPr>
@@ -965,14 +994,16 @@
           </a:bodyPr>
           <a:lstStyle/>
           <a:p>
-            <a:pPr/>
+            <a:endParaRPr/>
           </a:p>
         </p:txBody>
       </p:sp>
       <p:sp>
         <p:nvSpPr>
           <p:cNvPr id="21" name="Title Text"/>
-          <p:cNvSpPr txBox="1"/>
+          <p:cNvSpPr txBox="1">
+            <a:spLocks noGrp="1"/>
+          </p:cNvSpPr>
           <p:nvPr>
             <p:ph type="title"/>
           </p:nvPr>
@@ -990,7 +1021,6 @@
           <a:bodyPr anchor="b"/>
           <a:lstStyle/>
           <a:p>
-            <a:pPr/>
             <a:r>
               <a:t>Title Text</a:t>
             </a:r>
@@ -1000,7 +1030,9 @@
       <p:sp>
         <p:nvSpPr>
           <p:cNvPr id="22" name="Body Level One…"/>
-          <p:cNvSpPr txBox="1"/>
+          <p:cNvSpPr txBox="1">
+            <a:spLocks noGrp="1"/>
+          </p:cNvSpPr>
           <p:nvPr>
             <p:ph type="body" sz="quarter" idx="1"/>
           </p:nvPr>
@@ -1059,7 +1091,6 @@
             </a:lvl5pPr>
           </a:lstStyle>
           <a:p>
-            <a:pPr/>
             <a:r>
               <a:t>Body Level One</a:t>
             </a:r>
@@ -1093,7 +1124,9 @@
       <p:sp>
         <p:nvSpPr>
           <p:cNvPr id="23" name="Slide Number"/>
-          <p:cNvSpPr txBox="1"/>
+          <p:cNvSpPr txBox="1">
+            <a:spLocks noGrp="1"/>
+          </p:cNvSpPr>
           <p:nvPr>
             <p:ph type="sldNum" sz="quarter" idx="2"/>
           </p:nvPr>
@@ -1107,8 +1140,10 @@
           <a:bodyPr/>
           <a:lstStyle/>
           <a:p>
-            <a:pPr/>
-            <a:fld id="{86CB4B4D-7CA3-9044-876B-883B54F8677D}" type="slidenum"/>
+            <a:fld id="{86CB4B4D-7CA3-9044-876B-883B54F8677D}" type="slidenum">
+              <a:t>‹#›</a:t>
+            </a:fld>
+            <a:endParaRPr/>
           </a:p>
         </p:txBody>
       </p:sp>
@@ -1117,12 +1152,12 @@
   <p:clrMapOvr>
     <a:masterClrMapping/>
   </p:clrMapOvr>
-  <p:transition xmlns:p14="http://schemas.microsoft.com/office/powerpoint/2010/main" spd="med" advClick="1"/>
+  <p:transition spd="med"/>
 </p:sldLayout>
 </file>
 
 <file path=ppt/slideLayouts/slideLayout3.xml><?xml version="1.0" encoding="utf-8"?>
-<p:sldLayout xmlns:a="http://schemas.openxmlformats.org/drawingml/2006/main" xmlns:r="http://schemas.openxmlformats.org/officeDocument/2006/relationships" xmlns:p="http://schemas.openxmlformats.org/presentationml/2006/main" type="tx" showMasterSp="1" showMasterPhAnim="1">
+<p:sldLayout xmlns:a="http://schemas.openxmlformats.org/drawingml/2006/main" xmlns:r="http://schemas.openxmlformats.org/officeDocument/2006/relationships" xmlns:p="http://schemas.openxmlformats.org/presentationml/2006/main" type="tx">
   <p:cSld name="Title - Center">
     <p:spTree>
       <p:nvGrpSpPr>
@@ -1141,7 +1176,9 @@
       <p:sp>
         <p:nvSpPr>
           <p:cNvPr id="30" name="Title Text"/>
-          <p:cNvSpPr txBox="1"/>
+          <p:cNvSpPr txBox="1">
+            <a:spLocks noGrp="1"/>
+          </p:cNvSpPr>
           <p:nvPr>
             <p:ph type="title"/>
           </p:nvPr>
@@ -1159,7 +1196,6 @@
           <a:bodyPr/>
           <a:lstStyle/>
           <a:p>
-            <a:pPr/>
             <a:r>
               <a:t>Title Text</a:t>
             </a:r>
@@ -1169,7 +1205,9 @@
       <p:sp>
         <p:nvSpPr>
           <p:cNvPr id="31" name="Slide Number"/>
-          <p:cNvSpPr txBox="1"/>
+          <p:cNvSpPr txBox="1">
+            <a:spLocks noGrp="1"/>
+          </p:cNvSpPr>
           <p:nvPr>
             <p:ph type="sldNum" sz="quarter" idx="2"/>
           </p:nvPr>
@@ -1183,8 +1221,10 @@
           <a:bodyPr/>
           <a:lstStyle/>
           <a:p>
-            <a:pPr/>
-            <a:fld id="{86CB4B4D-7CA3-9044-876B-883B54F8677D}" type="slidenum"/>
+            <a:fld id="{86CB4B4D-7CA3-9044-876B-883B54F8677D}" type="slidenum">
+              <a:t>‹#›</a:t>
+            </a:fld>
+            <a:endParaRPr/>
           </a:p>
         </p:txBody>
       </p:sp>
@@ -1193,12 +1233,12 @@
   <p:clrMapOvr>
     <a:masterClrMapping/>
   </p:clrMapOvr>
-  <p:transition xmlns:p14="http://schemas.microsoft.com/office/powerpoint/2010/main" spd="med" advClick="1"/>
+  <p:transition spd="med"/>
 </p:sldLayout>
 </file>
 
 <file path=ppt/slideLayouts/slideLayout4.xml><?xml version="1.0" encoding="utf-8"?>
-<p:sldLayout xmlns:a="http://schemas.openxmlformats.org/drawingml/2006/main" xmlns:r="http://schemas.openxmlformats.org/officeDocument/2006/relationships" xmlns:p="http://schemas.openxmlformats.org/presentationml/2006/main" type="tx" showMasterSp="1" showMasterPhAnim="1">
+<p:sldLayout xmlns:a="http://schemas.openxmlformats.org/drawingml/2006/main" xmlns:r="http://schemas.openxmlformats.org/officeDocument/2006/relationships" xmlns:p="http://schemas.openxmlformats.org/presentationml/2006/main" type="tx">
   <p:cSld name="Photo - Vertical">
     <p:spTree>
       <p:nvGrpSpPr>
@@ -1217,7 +1257,9 @@
       <p:sp>
         <p:nvSpPr>
           <p:cNvPr id="38" name="Image"/>
-          <p:cNvSpPr/>
+          <p:cNvSpPr>
+            <a:spLocks noGrp="1"/>
+          </p:cNvSpPr>
           <p:nvPr>
             <p:ph type="pic" sz="half" idx="13"/>
           </p:nvPr>
@@ -1237,14 +1279,16 @@
           </a:bodyPr>
           <a:lstStyle/>
           <a:p>
-            <a:pPr/>
+            <a:endParaRPr/>
           </a:p>
         </p:txBody>
       </p:sp>
       <p:sp>
         <p:nvSpPr>
           <p:cNvPr id="39" name="Title Text"/>
-          <p:cNvSpPr txBox="1"/>
+          <p:cNvSpPr txBox="1">
+            <a:spLocks noGrp="1"/>
+          </p:cNvSpPr>
           <p:nvPr>
             <p:ph type="title"/>
           </p:nvPr>
@@ -1266,7 +1310,6 @@
             </a:lvl1pPr>
           </a:lstStyle>
           <a:p>
-            <a:pPr/>
             <a:r>
               <a:t>Title Text</a:t>
             </a:r>
@@ -1276,7 +1319,9 @@
       <p:sp>
         <p:nvSpPr>
           <p:cNvPr id="40" name="Body Level One…"/>
-          <p:cNvSpPr txBox="1"/>
+          <p:cNvSpPr txBox="1">
+            <a:spLocks noGrp="1"/>
+          </p:cNvSpPr>
           <p:nvPr>
             <p:ph type="body" sz="quarter" idx="1"/>
           </p:nvPr>
@@ -1335,7 +1380,6 @@
             </a:lvl5pPr>
           </a:lstStyle>
           <a:p>
-            <a:pPr/>
             <a:r>
               <a:t>Body Level One</a:t>
             </a:r>
@@ -1369,7 +1413,9 @@
       <p:sp>
         <p:nvSpPr>
           <p:cNvPr id="41" name="Slide Number"/>
-          <p:cNvSpPr txBox="1"/>
+          <p:cNvSpPr txBox="1">
+            <a:spLocks noGrp="1"/>
+          </p:cNvSpPr>
           <p:nvPr>
             <p:ph type="sldNum" sz="quarter" idx="2"/>
           </p:nvPr>
@@ -1383,8 +1429,10 @@
           <a:bodyPr/>
           <a:lstStyle/>
           <a:p>
-            <a:pPr/>
-            <a:fld id="{86CB4B4D-7CA3-9044-876B-883B54F8677D}" type="slidenum"/>
+            <a:fld id="{86CB4B4D-7CA3-9044-876B-883B54F8677D}" type="slidenum">
+              <a:t>‹#›</a:t>
+            </a:fld>
+            <a:endParaRPr/>
           </a:p>
         </p:txBody>
       </p:sp>
@@ -1393,12 +1441,12 @@
   <p:clrMapOvr>
     <a:masterClrMapping/>
   </p:clrMapOvr>
-  <p:transition xmlns:p14="http://schemas.microsoft.com/office/powerpoint/2010/main" spd="med" advClick="1"/>
+  <p:transition spd="med"/>
 </p:sldLayout>
 </file>
 
 <file path=ppt/slideLayouts/slideLayout5.xml><?xml version="1.0" encoding="utf-8"?>
-<p:sldLayout xmlns:a="http://schemas.openxmlformats.org/drawingml/2006/main" xmlns:r="http://schemas.openxmlformats.org/officeDocument/2006/relationships" xmlns:p="http://schemas.openxmlformats.org/presentationml/2006/main" type="tx" showMasterSp="1" showMasterPhAnim="1">
+<p:sldLayout xmlns:a="http://schemas.openxmlformats.org/drawingml/2006/main" xmlns:r="http://schemas.openxmlformats.org/officeDocument/2006/relationships" xmlns:p="http://schemas.openxmlformats.org/presentationml/2006/main" type="tx">
   <p:cSld name="Title - Top">
     <p:spTree>
       <p:nvGrpSpPr>
@@ -1417,7 +1465,9 @@
       <p:sp>
         <p:nvSpPr>
           <p:cNvPr id="48" name="Title Text"/>
-          <p:cNvSpPr txBox="1"/>
+          <p:cNvSpPr txBox="1">
+            <a:spLocks noGrp="1"/>
+          </p:cNvSpPr>
           <p:nvPr>
             <p:ph type="title"/>
           </p:nvPr>
@@ -1431,7 +1481,6 @@
           <a:bodyPr/>
           <a:lstStyle/>
           <a:p>
-            <a:pPr/>
             <a:r>
               <a:t>Title Text</a:t>
             </a:r>
@@ -1441,7 +1490,9 @@
       <p:sp>
         <p:nvSpPr>
           <p:cNvPr id="49" name="Slide Number"/>
-          <p:cNvSpPr txBox="1"/>
+          <p:cNvSpPr txBox="1">
+            <a:spLocks noGrp="1"/>
+          </p:cNvSpPr>
           <p:nvPr>
             <p:ph type="sldNum" sz="quarter" idx="2"/>
           </p:nvPr>
@@ -1455,8 +1506,10 @@
           <a:bodyPr/>
           <a:lstStyle/>
           <a:p>
-            <a:pPr/>
-            <a:fld id="{86CB4B4D-7CA3-9044-876B-883B54F8677D}" type="slidenum"/>
+            <a:fld id="{86CB4B4D-7CA3-9044-876B-883B54F8677D}" type="slidenum">
+              <a:t>‹#›</a:t>
+            </a:fld>
+            <a:endParaRPr/>
           </a:p>
         </p:txBody>
       </p:sp>
@@ -1465,12 +1518,12 @@
   <p:clrMapOvr>
     <a:masterClrMapping/>
   </p:clrMapOvr>
-  <p:transition xmlns:p14="http://schemas.microsoft.com/office/powerpoint/2010/main" spd="med" advClick="1"/>
+  <p:transition spd="med"/>
 </p:sldLayout>
 </file>
 
 <file path=ppt/slideLayouts/slideLayout6.xml><?xml version="1.0" encoding="utf-8"?>
-<p:sldLayout xmlns:a="http://schemas.openxmlformats.org/drawingml/2006/main" xmlns:r="http://schemas.openxmlformats.org/officeDocument/2006/relationships" xmlns:p="http://schemas.openxmlformats.org/presentationml/2006/main" type="tx" showMasterSp="1" showMasterPhAnim="1">
+<p:sldLayout xmlns:a="http://schemas.openxmlformats.org/drawingml/2006/main" xmlns:r="http://schemas.openxmlformats.org/officeDocument/2006/relationships" xmlns:p="http://schemas.openxmlformats.org/presentationml/2006/main" type="tx">
   <p:cSld name="Title &amp; Bullets">
     <p:spTree>
       <p:nvGrpSpPr>
@@ -1489,7 +1542,9 @@
       <p:sp>
         <p:nvSpPr>
           <p:cNvPr id="56" name="Title Text"/>
-          <p:cNvSpPr txBox="1"/>
+          <p:cNvSpPr txBox="1">
+            <a:spLocks noGrp="1"/>
+          </p:cNvSpPr>
           <p:nvPr>
             <p:ph type="title"/>
           </p:nvPr>
@@ -1503,7 +1558,6 @@
           <a:bodyPr/>
           <a:lstStyle/>
           <a:p>
-            <a:pPr/>
             <a:r>
               <a:t>Title Text</a:t>
             </a:r>
@@ -1513,7 +1567,9 @@
       <p:sp>
         <p:nvSpPr>
           <p:cNvPr id="57" name="Body Level One…"/>
-          <p:cNvSpPr txBox="1"/>
+          <p:cNvSpPr txBox="1">
+            <a:spLocks noGrp="1"/>
+          </p:cNvSpPr>
           <p:nvPr>
             <p:ph type="body" idx="1"/>
           </p:nvPr>
@@ -1527,7 +1583,6 @@
           <a:bodyPr/>
           <a:lstStyle/>
           <a:p>
-            <a:pPr/>
             <a:r>
               <a:t>Body Level One</a:t>
             </a:r>
@@ -1561,7 +1616,9 @@
       <p:sp>
         <p:nvSpPr>
           <p:cNvPr id="58" name="Slide Number"/>
-          <p:cNvSpPr txBox="1"/>
+          <p:cNvSpPr txBox="1">
+            <a:spLocks noGrp="1"/>
+          </p:cNvSpPr>
           <p:nvPr>
             <p:ph type="sldNum" sz="quarter" idx="2"/>
           </p:nvPr>
@@ -1575,8 +1632,10 @@
           <a:bodyPr/>
           <a:lstStyle/>
           <a:p>
-            <a:pPr/>
-            <a:fld id="{86CB4B4D-7CA3-9044-876B-883B54F8677D}" type="slidenum"/>
+            <a:fld id="{86CB4B4D-7CA3-9044-876B-883B54F8677D}" type="slidenum">
+              <a:t>‹#›</a:t>
+            </a:fld>
+            <a:endParaRPr/>
           </a:p>
         </p:txBody>
       </p:sp>
@@ -1585,12 +1644,12 @@
   <p:clrMapOvr>
     <a:masterClrMapping/>
   </p:clrMapOvr>
-  <p:transition xmlns:p14="http://schemas.microsoft.com/office/powerpoint/2010/main" spd="med" advClick="1"/>
+  <p:transition spd="med"/>
 </p:sldLayout>
 </file>
 
 <file path=ppt/slideLayouts/slideLayout7.xml><?xml version="1.0" encoding="utf-8"?>
-<p:sldLayout xmlns:a="http://schemas.openxmlformats.org/drawingml/2006/main" xmlns:r="http://schemas.openxmlformats.org/officeDocument/2006/relationships" xmlns:p="http://schemas.openxmlformats.org/presentationml/2006/main" type="tx" showMasterSp="1" showMasterPhAnim="1">
+<p:sldLayout xmlns:a="http://schemas.openxmlformats.org/drawingml/2006/main" xmlns:r="http://schemas.openxmlformats.org/officeDocument/2006/relationships" xmlns:p="http://schemas.openxmlformats.org/presentationml/2006/main" type="tx">
   <p:cSld name="Title, Bullets &amp; Photo">
     <p:spTree>
       <p:nvGrpSpPr>
@@ -1609,7 +1668,9 @@
       <p:sp>
         <p:nvSpPr>
           <p:cNvPr id="65" name="Image"/>
-          <p:cNvSpPr/>
+          <p:cNvSpPr>
+            <a:spLocks noGrp="1"/>
+          </p:cNvSpPr>
           <p:nvPr>
             <p:ph type="pic" sz="half" idx="13"/>
           </p:nvPr>
@@ -1629,14 +1690,16 @@
           </a:bodyPr>
           <a:lstStyle/>
           <a:p>
-            <a:pPr/>
+            <a:endParaRPr/>
           </a:p>
         </p:txBody>
       </p:sp>
       <p:sp>
         <p:nvSpPr>
           <p:cNvPr id="66" name="Title Text"/>
-          <p:cNvSpPr txBox="1"/>
+          <p:cNvSpPr txBox="1">
+            <a:spLocks noGrp="1"/>
+          </p:cNvSpPr>
           <p:nvPr>
             <p:ph type="title"/>
           </p:nvPr>
@@ -1650,7 +1713,6 @@
           <a:bodyPr/>
           <a:lstStyle/>
           <a:p>
-            <a:pPr/>
             <a:r>
               <a:t>Title Text</a:t>
             </a:r>
@@ -1660,7 +1722,9 @@
       <p:sp>
         <p:nvSpPr>
           <p:cNvPr id="67" name="Body Level One…"/>
-          <p:cNvSpPr txBox="1"/>
+          <p:cNvSpPr txBox="1">
+            <a:spLocks noGrp="1"/>
+          </p:cNvSpPr>
           <p:nvPr>
             <p:ph type="body" sz="half" idx="1"/>
           </p:nvPr>
@@ -1709,7 +1773,6 @@
             </a:lvl5pPr>
           </a:lstStyle>
           <a:p>
-            <a:pPr/>
             <a:r>
               <a:t>Body Level One</a:t>
             </a:r>
@@ -1743,7 +1806,9 @@
       <p:sp>
         <p:nvSpPr>
           <p:cNvPr id="68" name="Slide Number"/>
-          <p:cNvSpPr txBox="1"/>
+          <p:cNvSpPr txBox="1">
+            <a:spLocks noGrp="1"/>
+          </p:cNvSpPr>
           <p:nvPr>
             <p:ph type="sldNum" sz="quarter" idx="2"/>
           </p:nvPr>
@@ -1770,8 +1835,10 @@
             </a:lvl1pPr>
           </a:lstStyle>
           <a:p>
-            <a:pPr/>
-            <a:fld id="{86CB4B4D-7CA3-9044-876B-883B54F8677D}" type="slidenum"/>
+            <a:fld id="{86CB4B4D-7CA3-9044-876B-883B54F8677D}" type="slidenum">
+              <a:t>‹#›</a:t>
+            </a:fld>
+            <a:endParaRPr/>
           </a:p>
         </p:txBody>
       </p:sp>
@@ -1780,12 +1847,12 @@
   <p:clrMapOvr>
     <a:masterClrMapping/>
   </p:clrMapOvr>
-  <p:transition xmlns:p14="http://schemas.microsoft.com/office/powerpoint/2010/main" spd="med" advClick="1"/>
+  <p:transition spd="med"/>
 </p:sldLayout>
 </file>
 
 <file path=ppt/slideLayouts/slideLayout8.xml><?xml version="1.0" encoding="utf-8"?>
-<p:sldLayout xmlns:a="http://schemas.openxmlformats.org/drawingml/2006/main" xmlns:r="http://schemas.openxmlformats.org/officeDocument/2006/relationships" xmlns:p="http://schemas.openxmlformats.org/presentationml/2006/main" type="tx" showMasterSp="1" showMasterPhAnim="1">
+<p:sldLayout xmlns:a="http://schemas.openxmlformats.org/drawingml/2006/main" xmlns:r="http://schemas.openxmlformats.org/officeDocument/2006/relationships" xmlns:p="http://schemas.openxmlformats.org/presentationml/2006/main" type="tx">
   <p:cSld name="Bullets">
     <p:spTree>
       <p:nvGrpSpPr>
@@ -1804,7 +1871,9 @@
       <p:sp>
         <p:nvSpPr>
           <p:cNvPr id="75" name="Body Level One…"/>
-          <p:cNvSpPr txBox="1"/>
+          <p:cNvSpPr txBox="1">
+            <a:spLocks noGrp="1"/>
+          </p:cNvSpPr>
           <p:nvPr>
             <p:ph type="body" idx="1"/>
           </p:nvPr>
@@ -1822,7 +1891,6 @@
           <a:bodyPr/>
           <a:lstStyle/>
           <a:p>
-            <a:pPr/>
             <a:r>
               <a:t>Body Level One</a:t>
             </a:r>
@@ -1856,7 +1924,9 @@
       <p:sp>
         <p:nvSpPr>
           <p:cNvPr id="76" name="Slide Number"/>
-          <p:cNvSpPr txBox="1"/>
+          <p:cNvSpPr txBox="1">
+            <a:spLocks noGrp="1"/>
+          </p:cNvSpPr>
           <p:nvPr>
             <p:ph type="sldNum" sz="quarter" idx="2"/>
           </p:nvPr>
@@ -1870,8 +1940,10 @@
           <a:bodyPr/>
           <a:lstStyle/>
           <a:p>
-            <a:pPr/>
-            <a:fld id="{86CB4B4D-7CA3-9044-876B-883B54F8677D}" type="slidenum"/>
+            <a:fld id="{86CB4B4D-7CA3-9044-876B-883B54F8677D}" type="slidenum">
+              <a:t>‹#›</a:t>
+            </a:fld>
+            <a:endParaRPr/>
           </a:p>
         </p:txBody>
       </p:sp>
@@ -1880,12 +1952,12 @@
   <p:clrMapOvr>
     <a:masterClrMapping/>
   </p:clrMapOvr>
-  <p:transition xmlns:p14="http://schemas.microsoft.com/office/powerpoint/2010/main" spd="med" advClick="1"/>
+  <p:transition spd="med"/>
 </p:sldLayout>
 </file>
 
 <file path=ppt/slideLayouts/slideLayout9.xml><?xml version="1.0" encoding="utf-8"?>
-<p:sldLayout xmlns:a="http://schemas.openxmlformats.org/drawingml/2006/main" xmlns:r="http://schemas.openxmlformats.org/officeDocument/2006/relationships" xmlns:p="http://schemas.openxmlformats.org/presentationml/2006/main" type="tx" showMasterSp="1" showMasterPhAnim="1">
+<p:sldLayout xmlns:a="http://schemas.openxmlformats.org/drawingml/2006/main" xmlns:r="http://schemas.openxmlformats.org/officeDocument/2006/relationships" xmlns:p="http://schemas.openxmlformats.org/presentationml/2006/main" type="tx">
   <p:cSld name="Photo - 3 Up">
     <p:spTree>
       <p:nvGrpSpPr>
@@ -1904,7 +1976,9 @@
       <p:sp>
         <p:nvSpPr>
           <p:cNvPr id="83" name="Image"/>
-          <p:cNvSpPr/>
+          <p:cNvSpPr>
+            <a:spLocks noGrp="1"/>
+          </p:cNvSpPr>
           <p:nvPr>
             <p:ph type="pic" sz="quarter" idx="13"/>
           </p:nvPr>
@@ -1924,14 +1998,16 @@
           </a:bodyPr>
           <a:lstStyle/>
           <a:p>
-            <a:pPr/>
+            <a:endParaRPr/>
           </a:p>
         </p:txBody>
       </p:sp>
       <p:sp>
         <p:nvSpPr>
           <p:cNvPr id="84" name="Image"/>
-          <p:cNvSpPr/>
+          <p:cNvSpPr>
+            <a:spLocks noGrp="1"/>
+          </p:cNvSpPr>
           <p:nvPr>
             <p:ph type="pic" sz="quarter" idx="14"/>
           </p:nvPr>
@@ -1951,14 +2027,16 @@
           </a:bodyPr>
           <a:lstStyle/>
           <a:p>
-            <a:pPr/>
+            <a:endParaRPr/>
           </a:p>
         </p:txBody>
       </p:sp>
       <p:sp>
         <p:nvSpPr>
           <p:cNvPr id="85" name="Image"/>
-          <p:cNvSpPr/>
+          <p:cNvSpPr>
+            <a:spLocks noGrp="1"/>
+          </p:cNvSpPr>
           <p:nvPr>
             <p:ph type="pic" sz="half" idx="15"/>
           </p:nvPr>
@@ -1978,14 +2056,16 @@
           </a:bodyPr>
           <a:lstStyle/>
           <a:p>
-            <a:pPr/>
+            <a:endParaRPr/>
           </a:p>
         </p:txBody>
       </p:sp>
       <p:sp>
         <p:nvSpPr>
           <p:cNvPr id="86" name="Slide Number"/>
-          <p:cNvSpPr txBox="1"/>
+          <p:cNvSpPr txBox="1">
+            <a:spLocks noGrp="1"/>
+          </p:cNvSpPr>
           <p:nvPr>
             <p:ph type="sldNum" sz="quarter" idx="2"/>
           </p:nvPr>
@@ -1999,8 +2079,10 @@
           <a:bodyPr/>
           <a:lstStyle/>
           <a:p>
-            <a:pPr/>
-            <a:fld id="{86CB4B4D-7CA3-9044-876B-883B54F8677D}" type="slidenum"/>
+            <a:fld id="{86CB4B4D-7CA3-9044-876B-883B54F8677D}" type="slidenum">
+              <a:t>‹#›</a:t>
+            </a:fld>
+            <a:endParaRPr/>
           </a:p>
         </p:txBody>
       </p:sp>
@@ -2009,7 +2091,7 @@
   <p:clrMapOvr>
     <a:masterClrMapping/>
   </p:clrMapOvr>
-  <p:transition xmlns:p14="http://schemas.microsoft.com/office/powerpoint/2010/main" spd="med" advClick="1"/>
+  <p:transition spd="med"/>
 </p:sldLayout>
 </file>
 
@@ -2021,6 +2103,7 @@
         <a:solidFill>
           <a:srgbClr val="FFFFFF"/>
         </a:solidFill>
+        <a:effectLst/>
       </p:bgPr>
     </p:bg>
     <p:spTree>
@@ -2040,7 +2123,9 @@
       <p:sp>
         <p:nvSpPr>
           <p:cNvPr id="2" name="Title Text"/>
-          <p:cNvSpPr txBox="1"/>
+          <p:cNvSpPr txBox="1">
+            <a:spLocks noGrp="1"/>
+          </p:cNvSpPr>
           <p:nvPr>
             <p:ph type="title"/>
           </p:nvPr>
@@ -2058,17 +2143,16 @@
           </a:ln>
           <a:extLst>
             <a:ext uri="{C572A759-6A51-4108-AA02-DFA0A04FC94B}">
-              <ma14:wrappingTextBoxFlag xmlns:ma14="http://schemas.microsoft.com/office/mac/drawingml/2011/main" val="1"/>
+              <ma14:wrappingTextBoxFlag xmlns:ma14="http://schemas.microsoft.com/office/mac/drawingml/2011/main" xmlns="" val="1"/>
             </a:ext>
           </a:extLst>
         </p:spPr>
         <p:txBody>
           <a:bodyPr lIns="50800" tIns="50800" rIns="50800" bIns="50800" anchor="ctr">
-            <a:normAutofit fontScale="100000" lnSpcReduction="0"/>
+            <a:normAutofit/>
           </a:bodyPr>
           <a:lstStyle/>
           <a:p>
-            <a:pPr/>
             <a:r>
               <a:t>Title Text</a:t>
             </a:r>
@@ -2078,7 +2162,9 @@
       <p:sp>
         <p:nvSpPr>
           <p:cNvPr id="3" name="Body Level One…"/>
-          <p:cNvSpPr txBox="1"/>
+          <p:cNvSpPr txBox="1">
+            <a:spLocks noGrp="1"/>
+          </p:cNvSpPr>
           <p:nvPr>
             <p:ph type="body" idx="1"/>
           </p:nvPr>
@@ -2096,17 +2182,16 @@
           </a:ln>
           <a:extLst>
             <a:ext uri="{C572A759-6A51-4108-AA02-DFA0A04FC94B}">
-              <ma14:wrappingTextBoxFlag xmlns:ma14="http://schemas.microsoft.com/office/mac/drawingml/2011/main" val="1"/>
+              <ma14:wrappingTextBoxFlag xmlns:ma14="http://schemas.microsoft.com/office/mac/drawingml/2011/main" xmlns="" val="1"/>
             </a:ext>
           </a:extLst>
         </p:spPr>
         <p:txBody>
           <a:bodyPr lIns="50800" tIns="50800" rIns="50800" bIns="50800" anchor="ctr">
-            <a:normAutofit fontScale="100000" lnSpcReduction="0"/>
+            <a:normAutofit/>
           </a:bodyPr>
           <a:lstStyle/>
           <a:p>
-            <a:pPr/>
             <a:r>
               <a:t>Body Level One</a:t>
             </a:r>
@@ -2140,7 +2225,9 @@
       <p:sp>
         <p:nvSpPr>
           <p:cNvPr id="4" name="Slide Number"/>
-          <p:cNvSpPr txBox="1"/>
+          <p:cNvSpPr txBox="1">
+            <a:spLocks noGrp="1"/>
+          </p:cNvSpPr>
           <p:nvPr>
             <p:ph type="sldNum" sz="quarter" idx="2"/>
           </p:nvPr>
@@ -2163,7 +2250,7 @@
           </a:bodyPr>
           <a:lstStyle>
             <a:lvl1pPr>
-              <a:defRPr b="0" sz="1600">
+              <a:defRPr sz="1600" b="0">
                 <a:latin typeface="Helvetica Neue Light"/>
                 <a:ea typeface="Helvetica Neue Light"/>
                 <a:cs typeface="Helvetica Neue Light"/>
@@ -2172,8 +2259,10 @@
             </a:lvl1pPr>
           </a:lstStyle>
           <a:p>
-            <a:pPr/>
-            <a:fld id="{86CB4B4D-7CA3-9044-876B-883B54F8677D}" type="slidenum"/>
+            <a:fld id="{86CB4B4D-7CA3-9044-876B-883B54F8677D}" type="slidenum">
+              <a:t>‹#›</a:t>
+            </a:fld>
+            <a:endParaRPr/>
           </a:p>
         </p:txBody>
       </p:sp>
@@ -2181,20 +2270,20 @@
   </p:cSld>
   <p:clrMap bg1="lt1" tx1="dk1" bg2="lt2" tx2="dk2" accent1="accent1" accent2="accent2" accent3="accent3" accent4="accent4" accent5="accent5" accent6="accent6" hlink="hlink" folHlink="folHlink"/>
   <p:sldLayoutIdLst>
-    <p:sldLayoutId id="2147483649" r:id="rId2"/>
-    <p:sldLayoutId id="2147483650" r:id="rId3"/>
-    <p:sldLayoutId id="2147483651" r:id="rId4"/>
-    <p:sldLayoutId id="2147483652" r:id="rId5"/>
-    <p:sldLayoutId id="2147483653" r:id="rId6"/>
-    <p:sldLayoutId id="2147483654" r:id="rId7"/>
-    <p:sldLayoutId id="2147483655" r:id="rId8"/>
-    <p:sldLayoutId id="2147483656" r:id="rId9"/>
-    <p:sldLayoutId id="2147483657" r:id="rId10"/>
-    <p:sldLayoutId id="2147483658" r:id="rId11"/>
-    <p:sldLayoutId id="2147483659" r:id="rId12"/>
-    <p:sldLayoutId id="2147483660" r:id="rId13"/>
+    <p:sldLayoutId id="2147483649" r:id="rId1"/>
+    <p:sldLayoutId id="2147483650" r:id="rId2"/>
+    <p:sldLayoutId id="2147483651" r:id="rId3"/>
+    <p:sldLayoutId id="2147483652" r:id="rId4"/>
+    <p:sldLayoutId id="2147483653" r:id="rId5"/>
+    <p:sldLayoutId id="2147483654" r:id="rId6"/>
+    <p:sldLayoutId id="2147483655" r:id="rId7"/>
+    <p:sldLayoutId id="2147483656" r:id="rId8"/>
+    <p:sldLayoutId id="2147483657" r:id="rId9"/>
+    <p:sldLayoutId id="2147483658" r:id="rId10"/>
+    <p:sldLayoutId id="2147483659" r:id="rId11"/>
+    <p:sldLayoutId id="2147483660" r:id="rId12"/>
   </p:sldLayoutIdLst>
-  <p:transition xmlns:p14="http://schemas.microsoft.com/office/powerpoint/2010/main" spd="med" advClick="1"/>
+  <p:transition spd="med"/>
   <p:txStyles>
     <p:titleStyle>
       <a:lvl1pPr marL="0" marR="0" indent="0" algn="ctr" defTabSz="584200" rtl="0" latinLnBrk="0">
@@ -2212,7 +2301,7 @@
         <a:buFontTx/>
         <a:buNone/>
         <a:tabLst/>
-        <a:defRPr b="0" baseline="0" cap="none" i="0" spc="0" strike="noStrike" sz="8000" u="none">
+        <a:defRPr sz="8000" b="0" i="0" u="none" strike="noStrike" cap="none" spc="0" baseline="0">
           <a:ln>
             <a:noFill/>
           </a:ln>
@@ -2241,7 +2330,7 @@
         <a:buFontTx/>
         <a:buNone/>
         <a:tabLst/>
-        <a:defRPr b="0" baseline="0" cap="none" i="0" spc="0" strike="noStrike" sz="8000" u="none">
+        <a:defRPr sz="8000" b="0" i="0" u="none" strike="noStrike" cap="none" spc="0" baseline="0">
           <a:ln>
             <a:noFill/>
           </a:ln>
@@ -2270,7 +2359,7 @@
         <a:buFontTx/>
         <a:buNone/>
         <a:tabLst/>
-        <a:defRPr b="0" baseline="0" cap="none" i="0" spc="0" strike="noStrike" sz="8000" u="none">
+        <a:defRPr sz="8000" b="0" i="0" u="none" strike="noStrike" cap="none" spc="0" baseline="0">
           <a:ln>
             <a:noFill/>
           </a:ln>
@@ -2299,7 +2388,7 @@
         <a:buFontTx/>
         <a:buNone/>
         <a:tabLst/>
-        <a:defRPr b="0" baseline="0" cap="none" i="0" spc="0" strike="noStrike" sz="8000" u="none">
+        <a:defRPr sz="8000" b="0" i="0" u="none" strike="noStrike" cap="none" spc="0" baseline="0">
           <a:ln>
             <a:noFill/>
           </a:ln>
@@ -2328,7 +2417,7 @@
         <a:buFontTx/>
         <a:buNone/>
         <a:tabLst/>
-        <a:defRPr b="0" baseline="0" cap="none" i="0" spc="0" strike="noStrike" sz="8000" u="none">
+        <a:defRPr sz="8000" b="0" i="0" u="none" strike="noStrike" cap="none" spc="0" baseline="0">
           <a:ln>
             <a:noFill/>
           </a:ln>
@@ -2357,7 +2446,7 @@
         <a:buFontTx/>
         <a:buNone/>
         <a:tabLst/>
-        <a:defRPr b="0" baseline="0" cap="none" i="0" spc="0" strike="noStrike" sz="8000" u="none">
+        <a:defRPr sz="8000" b="0" i="0" u="none" strike="noStrike" cap="none" spc="0" baseline="0">
           <a:ln>
             <a:noFill/>
           </a:ln>
@@ -2386,7 +2475,7 @@
         <a:buFontTx/>
         <a:buNone/>
         <a:tabLst/>
-        <a:defRPr b="0" baseline="0" cap="none" i="0" spc="0" strike="noStrike" sz="8000" u="none">
+        <a:defRPr sz="8000" b="0" i="0" u="none" strike="noStrike" cap="none" spc="0" baseline="0">
           <a:ln>
             <a:noFill/>
           </a:ln>
@@ -2415,7 +2504,7 @@
         <a:buFontTx/>
         <a:buNone/>
         <a:tabLst/>
-        <a:defRPr b="0" baseline="0" cap="none" i="0" spc="0" strike="noStrike" sz="8000" u="none">
+        <a:defRPr sz="8000" b="0" i="0" u="none" strike="noStrike" cap="none" spc="0" baseline="0">
           <a:ln>
             <a:noFill/>
           </a:ln>
@@ -2444,7 +2533,7 @@
         <a:buFontTx/>
         <a:buNone/>
         <a:tabLst/>
-        <a:defRPr b="0" baseline="0" cap="none" i="0" spc="0" strike="noStrike" sz="8000" u="none">
+        <a:defRPr sz="8000" b="0" i="0" u="none" strike="noStrike" cap="none" spc="0" baseline="0">
           <a:ln>
             <a:noFill/>
           </a:ln>
@@ -2475,7 +2564,7 @@
         <a:buFontTx/>
         <a:buChar char="•"/>
         <a:tabLst/>
-        <a:defRPr b="0" baseline="0" cap="none" i="0" spc="0" strike="noStrike" sz="3200" u="none">
+        <a:defRPr sz="3200" b="0" i="0" u="none" strike="noStrike" cap="none" spc="0" baseline="0">
           <a:ln>
             <a:noFill/>
           </a:ln>
@@ -2504,7 +2593,7 @@
         <a:buFontTx/>
         <a:buChar char="•"/>
         <a:tabLst/>
-        <a:defRPr b="0" baseline="0" cap="none" i="0" spc="0" strike="noStrike" sz="3200" u="none">
+        <a:defRPr sz="3200" b="0" i="0" u="none" strike="noStrike" cap="none" spc="0" baseline="0">
           <a:ln>
             <a:noFill/>
           </a:ln>
@@ -2533,7 +2622,7 @@
         <a:buFontTx/>
         <a:buChar char="•"/>
         <a:tabLst/>
-        <a:defRPr b="0" baseline="0" cap="none" i="0" spc="0" strike="noStrike" sz="3200" u="none">
+        <a:defRPr sz="3200" b="0" i="0" u="none" strike="noStrike" cap="none" spc="0" baseline="0">
           <a:ln>
             <a:noFill/>
           </a:ln>
@@ -2562,7 +2651,7 @@
         <a:buFontTx/>
         <a:buChar char="•"/>
         <a:tabLst/>
-        <a:defRPr b="0" baseline="0" cap="none" i="0" spc="0" strike="noStrike" sz="3200" u="none">
+        <a:defRPr sz="3200" b="0" i="0" u="none" strike="noStrike" cap="none" spc="0" baseline="0">
           <a:ln>
             <a:noFill/>
           </a:ln>
@@ -2591,7 +2680,7 @@
         <a:buFontTx/>
         <a:buChar char="•"/>
         <a:tabLst/>
-        <a:defRPr b="0" baseline="0" cap="none" i="0" spc="0" strike="noStrike" sz="3200" u="none">
+        <a:defRPr sz="3200" b="0" i="0" u="none" strike="noStrike" cap="none" spc="0" baseline="0">
           <a:ln>
             <a:noFill/>
           </a:ln>
@@ -2620,7 +2709,7 @@
         <a:buFontTx/>
         <a:buChar char="•"/>
         <a:tabLst/>
-        <a:defRPr b="0" baseline="0" cap="none" i="0" spc="0" strike="noStrike" sz="3200" u="none">
+        <a:defRPr sz="3200" b="0" i="0" u="none" strike="noStrike" cap="none" spc="0" baseline="0">
           <a:ln>
             <a:noFill/>
           </a:ln>
@@ -2649,7 +2738,7 @@
         <a:buFontTx/>
         <a:buChar char="•"/>
         <a:tabLst/>
-        <a:defRPr b="0" baseline="0" cap="none" i="0" spc="0" strike="noStrike" sz="3200" u="none">
+        <a:defRPr sz="3200" b="0" i="0" u="none" strike="noStrike" cap="none" spc="0" baseline="0">
           <a:ln>
             <a:noFill/>
           </a:ln>
@@ -2678,7 +2767,7 @@
         <a:buFontTx/>
         <a:buChar char="•"/>
         <a:tabLst/>
-        <a:defRPr b="0" baseline="0" cap="none" i="0" spc="0" strike="noStrike" sz="3200" u="none">
+        <a:defRPr sz="3200" b="0" i="0" u="none" strike="noStrike" cap="none" spc="0" baseline="0">
           <a:ln>
             <a:noFill/>
           </a:ln>
@@ -2707,7 +2796,7 @@
         <a:buFontTx/>
         <a:buChar char="•"/>
         <a:tabLst/>
-        <a:defRPr b="0" baseline="0" cap="none" i="0" spc="0" strike="noStrike" sz="3200" u="none">
+        <a:defRPr sz="3200" b="0" i="0" u="none" strike="noStrike" cap="none" spc="0" baseline="0">
           <a:ln>
             <a:noFill/>
           </a:ln>
@@ -2738,7 +2827,7 @@
         <a:buFontTx/>
         <a:buNone/>
         <a:tabLst/>
-        <a:defRPr b="0" baseline="0" cap="none" i="0" spc="0" strike="noStrike" sz="1600" u="none">
+        <a:defRPr sz="1600" b="0" i="0" u="none" strike="noStrike" cap="none" spc="0" baseline="0">
           <a:ln>
             <a:noFill/>
           </a:ln>
@@ -2767,7 +2856,7 @@
         <a:buFontTx/>
         <a:buNone/>
         <a:tabLst/>
-        <a:defRPr b="0" baseline="0" cap="none" i="0" spc="0" strike="noStrike" sz="1600" u="none">
+        <a:defRPr sz="1600" b="0" i="0" u="none" strike="noStrike" cap="none" spc="0" baseline="0">
           <a:ln>
             <a:noFill/>
           </a:ln>
@@ -2796,7 +2885,7 @@
         <a:buFontTx/>
         <a:buNone/>
         <a:tabLst/>
-        <a:defRPr b="0" baseline="0" cap="none" i="0" spc="0" strike="noStrike" sz="1600" u="none">
+        <a:defRPr sz="1600" b="0" i="0" u="none" strike="noStrike" cap="none" spc="0" baseline="0">
           <a:ln>
             <a:noFill/>
           </a:ln>
@@ -2825,7 +2914,7 @@
         <a:buFontTx/>
         <a:buNone/>
         <a:tabLst/>
-        <a:defRPr b="0" baseline="0" cap="none" i="0" spc="0" strike="noStrike" sz="1600" u="none">
+        <a:defRPr sz="1600" b="0" i="0" u="none" strike="noStrike" cap="none" spc="0" baseline="0">
           <a:ln>
             <a:noFill/>
           </a:ln>
@@ -2854,7 +2943,7 @@
         <a:buFontTx/>
         <a:buNone/>
         <a:tabLst/>
-        <a:defRPr b="0" baseline="0" cap="none" i="0" spc="0" strike="noStrike" sz="1600" u="none">
+        <a:defRPr sz="1600" b="0" i="0" u="none" strike="noStrike" cap="none" spc="0" baseline="0">
           <a:ln>
             <a:noFill/>
           </a:ln>
@@ -2883,7 +2972,7 @@
         <a:buFontTx/>
         <a:buNone/>
         <a:tabLst/>
-        <a:defRPr b="0" baseline="0" cap="none" i="0" spc="0" strike="noStrike" sz="1600" u="none">
+        <a:defRPr sz="1600" b="0" i="0" u="none" strike="noStrike" cap="none" spc="0" baseline="0">
           <a:ln>
             <a:noFill/>
           </a:ln>
@@ -2912,7 +3001,7 @@
         <a:buFontTx/>
         <a:buNone/>
         <a:tabLst/>
-        <a:defRPr b="0" baseline="0" cap="none" i="0" spc="0" strike="noStrike" sz="1600" u="none">
+        <a:defRPr sz="1600" b="0" i="0" u="none" strike="noStrike" cap="none" spc="0" baseline="0">
           <a:ln>
             <a:noFill/>
           </a:ln>
@@ -2941,7 +3030,7 @@
         <a:buFontTx/>
         <a:buNone/>
         <a:tabLst/>
-        <a:defRPr b="0" baseline="0" cap="none" i="0" spc="0" strike="noStrike" sz="1600" u="none">
+        <a:defRPr sz="1600" b="0" i="0" u="none" strike="noStrike" cap="none" spc="0" baseline="0">
           <a:ln>
             <a:noFill/>
           </a:ln>
@@ -2970,7 +3059,7 @@
         <a:buFontTx/>
         <a:buNone/>
         <a:tabLst/>
-        <a:defRPr b="0" baseline="0" cap="none" i="0" spc="0" strike="noStrike" sz="1600" u="none">
+        <a:defRPr sz="1600" b="0" i="0" u="none" strike="noStrike" cap="none" spc="0" baseline="0">
           <a:ln>
             <a:noFill/>
           </a:ln>
@@ -2990,7 +3079,7 @@
 </file>
 
 <file path=ppt/slides/slide1.xml><?xml version="1.0" encoding="utf-8"?>
-<p:sld xmlns:a="http://schemas.openxmlformats.org/drawingml/2006/main" xmlns:r="http://schemas.openxmlformats.org/officeDocument/2006/relationships" xmlns:p="http://schemas.openxmlformats.org/presentationml/2006/main" showMasterSp="1" showMasterPhAnim="1">
+<p:sld xmlns:a="http://schemas.openxmlformats.org/drawingml/2006/main" xmlns:r="http://schemas.openxmlformats.org/officeDocument/2006/relationships" xmlns:p="http://schemas.openxmlformats.org/presentationml/2006/main">
   <p:cSld>
     <p:spTree>
       <p:nvGrpSpPr>
@@ -3009,7 +3098,9 @@
       <p:sp>
         <p:nvSpPr>
           <p:cNvPr id="119" name="Two heavy support required systems are retired…"/>
-          <p:cNvSpPr txBox="1"/>
+          <p:cNvSpPr txBox="1">
+            <a:spLocks noGrp="1"/>
+          </p:cNvSpPr>
           <p:nvPr>
             <p:ph type="body" idx="1"/>
           </p:nvPr>
@@ -3038,7 +3129,7 @@
             </a:r>
           </a:p>
           <a:p>
-            <a:pPr lvl="1" marL="844550" indent="-422275" defTabSz="554990">
+            <a:pPr marL="844550" lvl="1" indent="-422275" defTabSz="554990">
               <a:spcBef>
                 <a:spcPts val="0"/>
               </a:spcBef>
@@ -3049,7 +3140,7 @@
             </a:r>
           </a:p>
           <a:p>
-            <a:pPr lvl="1" marL="844550" indent="-422275" defTabSz="554990">
+            <a:pPr marL="844550" lvl="1" indent="-422275" defTabSz="554990">
               <a:spcBef>
                 <a:spcPts val="0"/>
               </a:spcBef>
@@ -3071,7 +3162,7 @@
             </a:r>
           </a:p>
           <a:p>
-            <a:pPr lvl="1" marL="778569" indent="-356294" defTabSz="554990">
+            <a:pPr marL="778569" lvl="1" indent="-356294" defTabSz="554990">
               <a:spcBef>
                 <a:spcPts val="0"/>
               </a:spcBef>
@@ -3082,7 +3173,7 @@
             </a:r>
           </a:p>
           <a:p>
-            <a:pPr lvl="1" marL="778569" indent="-356294" defTabSz="554990">
+            <a:pPr marL="778569" lvl="1" indent="-356294" defTabSz="554990">
               <a:spcBef>
                 <a:spcPts val="0"/>
               </a:spcBef>
@@ -3093,7 +3184,7 @@
             </a:r>
           </a:p>
           <a:p>
-            <a:pPr lvl="1" marL="778569" indent="-356294" defTabSz="554990">
+            <a:pPr marL="778569" lvl="1" indent="-356294" defTabSz="554990">
               <a:spcBef>
                 <a:spcPts val="0"/>
               </a:spcBef>
@@ -3115,7 +3206,7 @@
             </a:r>
           </a:p>
           <a:p>
-            <a:pPr lvl="1" marL="778569" indent="-356294" defTabSz="554990">
+            <a:pPr marL="778569" lvl="1" indent="-356294" defTabSz="554990">
               <a:spcBef>
                 <a:spcPts val="0"/>
               </a:spcBef>
@@ -3179,21 +3270,20 @@
           </a:ln>
           <a:extLst>
             <a:ext uri="{C572A759-6A51-4108-AA02-DFA0A04FC94B}">
-              <ma14:wrappingTextBoxFlag xmlns:ma14="http://schemas.microsoft.com/office/mac/drawingml/2011/main" val="1"/>
+              <ma14:wrappingTextBoxFlag xmlns:ma14="http://schemas.microsoft.com/office/mac/drawingml/2011/main" xmlns="" val="1"/>
             </a:ext>
           </a:extLst>
         </p:spPr>
         <p:txBody>
           <a:bodyPr lIns="50800" tIns="50800" rIns="50800" bIns="50800">
-            <a:normAutofit fontScale="100000" lnSpcReduction="0"/>
+            <a:normAutofit/>
           </a:bodyPr>
           <a:lstStyle>
             <a:lvl1pPr>
-              <a:defRPr b="0" sz="3700"/>
+              <a:defRPr sz="3700" b="0"/>
             </a:lvl1pPr>
           </a:lstStyle>
           <a:p>
-            <a:pPr/>
             <a:r>
               <a:t>Why is JEMM2 Good for Jostens?</a:t>
             </a:r>
@@ -3205,12 +3295,12 @@
   <p:clrMapOvr>
     <a:masterClrMapping/>
   </p:clrMapOvr>
-  <p:transition xmlns:p14="http://schemas.microsoft.com/office/powerpoint/2010/main" spd="med" advClick="1"/>
+  <p:transition spd="med"/>
 </p:sld>
 </file>
 
 <file path=ppt/slides/slide2.xml><?xml version="1.0" encoding="utf-8"?>
-<p:sld xmlns:a="http://schemas.openxmlformats.org/drawingml/2006/main" xmlns:r="http://schemas.openxmlformats.org/officeDocument/2006/relationships" xmlns:p="http://schemas.openxmlformats.org/presentationml/2006/main" showMasterSp="1" showMasterPhAnim="1">
+<p:sld xmlns:a="http://schemas.openxmlformats.org/drawingml/2006/main" xmlns:r="http://schemas.openxmlformats.org/officeDocument/2006/relationships" xmlns:p="http://schemas.openxmlformats.org/presentationml/2006/main">
   <p:cSld>
     <p:spTree>
       <p:nvGrpSpPr>
@@ -3229,7 +3319,9 @@
       <p:sp>
         <p:nvSpPr>
           <p:cNvPr id="122" name="Freedom from primary support responsibilities…"/>
-          <p:cNvSpPr txBox="1"/>
+          <p:cNvSpPr txBox="1">
+            <a:spLocks noGrp="1"/>
+          </p:cNvSpPr>
           <p:nvPr>
             <p:ph type="body" idx="1"/>
           </p:nvPr>
@@ -3258,7 +3350,7 @@
             </a:r>
           </a:p>
           <a:p>
-            <a:pPr lvl="1" marL="819546" indent="-375046">
+            <a:pPr marL="819546" lvl="1" indent="-375046">
               <a:spcBef>
                 <a:spcPts val="0"/>
               </a:spcBef>
@@ -3269,7 +3361,7 @@
             </a:r>
           </a:p>
           <a:p>
-            <a:pPr lvl="1" marL="819546" indent="-375046">
+            <a:pPr marL="819546" lvl="1" indent="-375046">
               <a:spcBef>
                 <a:spcPts val="0"/>
               </a:spcBef>
@@ -3280,7 +3372,7 @@
             </a:r>
           </a:p>
           <a:p>
-            <a:pPr lvl="1" marL="819546" indent="-375046">
+            <a:pPr marL="819546" lvl="1" indent="-375046">
               <a:spcBef>
                 <a:spcPts val="0"/>
               </a:spcBef>
@@ -3388,21 +3480,20 @@
           </a:ln>
           <a:extLst>
             <a:ext uri="{C572A759-6A51-4108-AA02-DFA0A04FC94B}">
-              <ma14:wrappingTextBoxFlag xmlns:ma14="http://schemas.microsoft.com/office/mac/drawingml/2011/main" val="1"/>
+              <ma14:wrappingTextBoxFlag xmlns:ma14="http://schemas.microsoft.com/office/mac/drawingml/2011/main" xmlns="" val="1"/>
             </a:ext>
           </a:extLst>
         </p:spPr>
         <p:txBody>
           <a:bodyPr lIns="50800" tIns="50800" rIns="50800" bIns="50800">
-            <a:normAutofit fontScale="100000" lnSpcReduction="0"/>
+            <a:normAutofit/>
           </a:bodyPr>
           <a:lstStyle>
             <a:lvl1pPr>
-              <a:defRPr b="0" sz="3700"/>
+              <a:defRPr sz="3700" b="0"/>
             </a:lvl1pPr>
           </a:lstStyle>
           <a:p>
-            <a:pPr/>
             <a:r>
               <a:t>Why is JEMM2 Good for the DAM Team?</a:t>
             </a:r>
@@ -3414,12 +3505,12 @@
   <p:clrMapOvr>
     <a:masterClrMapping/>
   </p:clrMapOvr>
-  <p:transition xmlns:p14="http://schemas.microsoft.com/office/powerpoint/2010/main" spd="med" advClick="1"/>
+  <p:transition spd="med"/>
 </p:sld>
 </file>
 
 <file path=ppt/slides/slide3.xml><?xml version="1.0" encoding="utf-8"?>
-<p:sld xmlns:a="http://schemas.openxmlformats.org/drawingml/2006/main" xmlns:r="http://schemas.openxmlformats.org/officeDocument/2006/relationships" xmlns:p="http://schemas.openxmlformats.org/presentationml/2006/main" showMasterSp="1" showMasterPhAnim="1">
+<p:sld xmlns:a="http://schemas.openxmlformats.org/drawingml/2006/main" xmlns:r="http://schemas.openxmlformats.org/officeDocument/2006/relationships" xmlns:p="http://schemas.openxmlformats.org/presentationml/2006/main">
   <p:cSld>
     <p:spTree>
       <p:nvGrpSpPr>
@@ -3438,7 +3529,9 @@
       <p:sp>
         <p:nvSpPr>
           <p:cNvPr id="125" name="Understand how images can be translated and displayed on websites using a technology like ImageMagick  (Kristen)…"/>
-          <p:cNvSpPr txBox="1"/>
+          <p:cNvSpPr txBox="1">
+            <a:spLocks noGrp="1"/>
+          </p:cNvSpPr>
           <p:nvPr>
             <p:ph type="body" idx="1"/>
           </p:nvPr>
@@ -3463,7 +3556,16 @@
               <a:defRPr sz="2600"/>
             </a:pPr>
             <a:r>
-              <a:t>Understand how images can be translated and displayed on websites using a technology like ImageMagick  (Kristen)</a:t>
+              <a:rPr dirty="0"/>
+              <a:t>Understand how images can be translated and displayed on websites using a technology like </a:t>
+            </a:r>
+            <a:r>
+              <a:rPr dirty="0" err="1"/>
+              <a:t>ImageMagick</a:t>
+            </a:r>
+            <a:r>
+              <a:rPr dirty="0"/>
+              <a:t>  (Kristen)</a:t>
             </a:r>
           </a:p>
           <a:p>
@@ -3474,6 +3576,7 @@
               <a:defRPr sz="2600"/>
             </a:pPr>
             <a:r>
+              <a:rPr dirty="0"/>
               <a:t>Build framework so all MB metadata for assets is in Oracle and kept current as changes happen.  This is for data analysis and future migration (Nick)</a:t>
             </a:r>
           </a:p>
@@ -3485,6 +3588,7 @@
               <a:defRPr sz="2600"/>
             </a:pPr>
             <a:r>
+              <a:rPr dirty="0"/>
               <a:t>Understand technology stack of Jostens applications and deployment/support standards to assure they’re part of JEMM2 (Wade)</a:t>
             </a:r>
           </a:p>
@@ -3496,6 +3600,7 @@
               <a:defRPr sz="2600"/>
             </a:pPr>
             <a:r>
+              <a:rPr dirty="0"/>
               <a:t>Project management methodology defined and implemented (David)</a:t>
             </a:r>
           </a:p>
@@ -3507,6 +3612,7 @@
               <a:defRPr sz="2600"/>
             </a:pPr>
             <a:r>
+              <a:rPr dirty="0"/>
               <a:t>Spread word and get input/requirements from the business (Paul)</a:t>
             </a:r>
           </a:p>
@@ -3518,6 +3624,7 @@
               <a:defRPr sz="2600"/>
             </a:pPr>
             <a:r>
+              <a:rPr dirty="0"/>
               <a:t>Defining what is JEMM2 at high level: Assets it will cover, architecture, metadata, user interface and process flow (Paul, Wade, David)</a:t>
             </a:r>
           </a:p>
@@ -3529,8 +3636,21 @@
               <a:defRPr sz="2600"/>
             </a:pPr>
             <a:r>
-              <a:t>Examining daily support tasks and what would be improvements to those tasks in terms of user interface and workflow (Zach, Carol Ann)</a:t>
-            </a:r>
+              <a:t>Examining daily support tasks and what would be improvements to those tasks in terms of user interface and workflow (Zach, </a:t>
+            </a:r>
+            <a:r>
+              <a:rPr/>
+              <a:t>Carol </a:t>
+            </a:r>
+            <a:r>
+              <a:rPr lang="en-US"/>
+              <a:t>Lynn</a:t>
+            </a:r>
+            <a:r>
+              <a:rPr/>
+              <a:t>)</a:t>
+            </a:r>
+            <a:endParaRPr/>
           </a:p>
         </p:txBody>
       </p:sp>
@@ -3553,21 +3673,20 @@
           </a:ln>
           <a:extLst>
             <a:ext uri="{C572A759-6A51-4108-AA02-DFA0A04FC94B}">
-              <ma14:wrappingTextBoxFlag xmlns:ma14="http://schemas.microsoft.com/office/mac/drawingml/2011/main" val="1"/>
+              <ma14:wrappingTextBoxFlag xmlns:ma14="http://schemas.microsoft.com/office/mac/drawingml/2011/main" xmlns="" val="1"/>
             </a:ext>
           </a:extLst>
         </p:spPr>
         <p:txBody>
           <a:bodyPr lIns="50800" tIns="50800" rIns="50800" bIns="50800">
-            <a:normAutofit fontScale="100000" lnSpcReduction="0"/>
+            <a:normAutofit/>
           </a:bodyPr>
           <a:lstStyle>
             <a:lvl1pPr>
-              <a:defRPr b="0" sz="3700"/>
+              <a:defRPr sz="3700" b="0"/>
             </a:lvl1pPr>
           </a:lstStyle>
           <a:p>
-            <a:pPr/>
             <a:r>
               <a:t>JEMM2 - What Would Come First?</a:t>
             </a:r>
@@ -3579,12 +3698,12 @@
   <p:clrMapOvr>
     <a:masterClrMapping/>
   </p:clrMapOvr>
-  <p:transition xmlns:p14="http://schemas.microsoft.com/office/powerpoint/2010/main" spd="med" advClick="1"/>
+  <p:transition spd="med"/>
 </p:sld>
 </file>
 
 <file path=ppt/theme/theme1.xml><?xml version="1.0" encoding="utf-8"?>
-<a:theme xmlns:a="http://schemas.openxmlformats.org/drawingml/2006/main" xmlns:r="http://schemas.openxmlformats.org/officeDocument/2006/relationships" name="White">
+<a:theme xmlns:a="http://schemas.openxmlformats.org/drawingml/2006/main" name="White">
   <a:themeElements>
     <a:clrScheme name="White">
       <a:dk1>
@@ -3783,7 +3902,7 @@
         <a:effectLst/>
         <a:sp3d/>
       </a:spPr>
-      <a:bodyPr rot="0" spcFirstLastPara="1" vertOverflow="overflow" horzOverflow="overflow" vert="horz" wrap="square" lIns="50800" tIns="50800" rIns="50800" bIns="50800" numCol="1" spcCol="38100" rtlCol="0" anchor="ctr" upright="0">
+      <a:bodyPr rot="0" spcFirstLastPara="1" vertOverflow="overflow" horzOverflow="overflow" vert="horz" wrap="square" lIns="50800" tIns="50800" rIns="50800" bIns="50800" numCol="1" spcCol="38100" rtlCol="0" anchor="ctr">
         <a:spAutoFit/>
       </a:bodyPr>
       <a:lstStyle>
@@ -3802,7 +3921,7 @@
           <a:buFontTx/>
           <a:buNone/>
           <a:tabLst/>
-          <a:defRPr b="0" baseline="0" cap="none" i="0" spc="0" strike="noStrike" sz="2200" u="none" kumimoji="0" normalizeH="0">
+          <a:defRPr kumimoji="0" sz="2200" b="0" i="0" u="none" strike="noStrike" cap="none" spc="0" normalizeH="0" baseline="0">
             <a:ln>
               <a:noFill/>
             </a:ln>
@@ -3832,7 +3951,7 @@
           <a:buFontTx/>
           <a:buNone/>
           <a:tabLst/>
-          <a:defRPr b="0" baseline="0" cap="none" i="0" spc="0" strike="noStrike" sz="1800" u="none" kumimoji="0" normalizeH="0">
+          <a:defRPr kumimoji="0" sz="1800" b="0" i="0" u="none" strike="noStrike" cap="none" spc="0" normalizeH="0" baseline="0">
             <a:ln>
               <a:noFill/>
             </a:ln>
@@ -3858,7 +3977,7 @@
           <a:buFontTx/>
           <a:buNone/>
           <a:tabLst/>
-          <a:defRPr b="0" baseline="0" cap="none" i="0" spc="0" strike="noStrike" sz="1800" u="none" kumimoji="0" normalizeH="0">
+          <a:defRPr kumimoji="0" sz="1800" b="0" i="0" u="none" strike="noStrike" cap="none" spc="0" normalizeH="0" baseline="0">
             <a:ln>
               <a:noFill/>
             </a:ln>
@@ -3884,7 +4003,7 @@
           <a:buFontTx/>
           <a:buNone/>
           <a:tabLst/>
-          <a:defRPr b="0" baseline="0" cap="none" i="0" spc="0" strike="noStrike" sz="1800" u="none" kumimoji="0" normalizeH="0">
+          <a:defRPr kumimoji="0" sz="1800" b="0" i="0" u="none" strike="noStrike" cap="none" spc="0" normalizeH="0" baseline="0">
             <a:ln>
               <a:noFill/>
             </a:ln>
@@ -3910,7 +4029,7 @@
           <a:buFontTx/>
           <a:buNone/>
           <a:tabLst/>
-          <a:defRPr b="0" baseline="0" cap="none" i="0" spc="0" strike="noStrike" sz="1800" u="none" kumimoji="0" normalizeH="0">
+          <a:defRPr kumimoji="0" sz="1800" b="0" i="0" u="none" strike="noStrike" cap="none" spc="0" normalizeH="0" baseline="0">
             <a:ln>
               <a:noFill/>
             </a:ln>
@@ -3936,7 +4055,7 @@
           <a:buFontTx/>
           <a:buNone/>
           <a:tabLst/>
-          <a:defRPr b="0" baseline="0" cap="none" i="0" spc="0" strike="noStrike" sz="1800" u="none" kumimoji="0" normalizeH="0">
+          <a:defRPr kumimoji="0" sz="1800" b="0" i="0" u="none" strike="noStrike" cap="none" spc="0" normalizeH="0" baseline="0">
             <a:ln>
               <a:noFill/>
             </a:ln>
@@ -3962,7 +4081,7 @@
           <a:buFontTx/>
           <a:buNone/>
           <a:tabLst/>
-          <a:defRPr b="0" baseline="0" cap="none" i="0" spc="0" strike="noStrike" sz="1800" u="none" kumimoji="0" normalizeH="0">
+          <a:defRPr kumimoji="0" sz="1800" b="0" i="0" u="none" strike="noStrike" cap="none" spc="0" normalizeH="0" baseline="0">
             <a:ln>
               <a:noFill/>
             </a:ln>
@@ -3988,7 +4107,7 @@
           <a:buFontTx/>
           <a:buNone/>
           <a:tabLst/>
-          <a:defRPr b="0" baseline="0" cap="none" i="0" spc="0" strike="noStrike" sz="1800" u="none" kumimoji="0" normalizeH="0">
+          <a:defRPr kumimoji="0" sz="1800" b="0" i="0" u="none" strike="noStrike" cap="none" spc="0" normalizeH="0" baseline="0">
             <a:ln>
               <a:noFill/>
             </a:ln>
@@ -4014,7 +4133,7 @@
           <a:buFontTx/>
           <a:buNone/>
           <a:tabLst/>
-          <a:defRPr b="0" baseline="0" cap="none" i="0" spc="0" strike="noStrike" sz="1800" u="none" kumimoji="0" normalizeH="0">
+          <a:defRPr kumimoji="0" sz="1800" b="0" i="0" u="none" strike="noStrike" cap="none" spc="0" normalizeH="0" baseline="0">
             <a:ln>
               <a:noFill/>
             </a:ln>
@@ -4040,7 +4159,7 @@
           <a:buFontTx/>
           <a:buNone/>
           <a:tabLst/>
-          <a:defRPr b="0" baseline="0" cap="none" i="0" spc="0" strike="noStrike" sz="1800" u="none" kumimoji="0" normalizeH="0">
+          <a:defRPr kumimoji="0" sz="1800" b="0" i="0" u="none" strike="noStrike" cap="none" spc="0" normalizeH="0" baseline="0">
             <a:ln>
               <a:noFill/>
             </a:ln>
@@ -4053,9 +4172,15 @@
         </a:lvl9pPr>
       </a:lstStyle>
       <a:style>
-        <a:lnRef idx="0"/>
-        <a:fillRef idx="0"/>
-        <a:effectRef idx="0"/>
+        <a:lnRef idx="0">
+          <a:scrgbClr r="0" g="0" b="0"/>
+        </a:lnRef>
+        <a:fillRef idx="0">
+          <a:scrgbClr r="0" g="0" b="0"/>
+        </a:fillRef>
+        <a:effectRef idx="0">
+          <a:scrgbClr r="0" g="0" b="0"/>
+        </a:effectRef>
         <a:fontRef idx="none"/>
       </a:style>
     </a:spDef>
@@ -4072,7 +4197,7 @@
         <a:effectLst/>
         <a:sp3d/>
       </a:spPr>
-      <a:bodyPr rot="0" spcFirstLastPara="1" vertOverflow="overflow" horzOverflow="overflow" vert="horz" wrap="square" lIns="91439" tIns="45719" rIns="91439" bIns="45719" numCol="1" spcCol="38100" rtlCol="0" anchor="t" upright="0">
+      <a:bodyPr rot="0" spcFirstLastPara="1" vertOverflow="overflow" horzOverflow="overflow" vert="horz" wrap="square" lIns="91439" tIns="45719" rIns="91439" bIns="45719" numCol="1" spcCol="38100" rtlCol="0" anchor="t">
         <a:noAutofit/>
       </a:bodyPr>
       <a:lstStyle>
@@ -4091,7 +4216,7 @@
           <a:buFontTx/>
           <a:buNone/>
           <a:tabLst/>
-          <a:defRPr b="0" baseline="0" cap="none" i="0" spc="0" strike="noStrike" sz="1800" u="none" kumimoji="0" normalizeH="0">
+          <a:defRPr kumimoji="0" sz="1800" b="0" i="0" u="none" strike="noStrike" cap="none" spc="0" normalizeH="0" baseline="0">
             <a:ln>
               <a:noFill/>
             </a:ln>
@@ -4117,7 +4242,7 @@
           <a:buFontTx/>
           <a:buNone/>
           <a:tabLst/>
-          <a:defRPr b="0" baseline="0" cap="none" i="0" spc="0" strike="noStrike" sz="1800" u="none" kumimoji="0" normalizeH="0">
+          <a:defRPr kumimoji="0" sz="1800" b="0" i="0" u="none" strike="noStrike" cap="none" spc="0" normalizeH="0" baseline="0">
             <a:ln>
               <a:noFill/>
             </a:ln>
@@ -4143,7 +4268,7 @@
           <a:buFontTx/>
           <a:buNone/>
           <a:tabLst/>
-          <a:defRPr b="0" baseline="0" cap="none" i="0" spc="0" strike="noStrike" sz="1800" u="none" kumimoji="0" normalizeH="0">
+          <a:defRPr kumimoji="0" sz="1800" b="0" i="0" u="none" strike="noStrike" cap="none" spc="0" normalizeH="0" baseline="0">
             <a:ln>
               <a:noFill/>
             </a:ln>
@@ -4169,7 +4294,7 @@
           <a:buFontTx/>
           <a:buNone/>
           <a:tabLst/>
-          <a:defRPr b="0" baseline="0" cap="none" i="0" spc="0" strike="noStrike" sz="1800" u="none" kumimoji="0" normalizeH="0">
+          <a:defRPr kumimoji="0" sz="1800" b="0" i="0" u="none" strike="noStrike" cap="none" spc="0" normalizeH="0" baseline="0">
             <a:ln>
               <a:noFill/>
             </a:ln>
@@ -4195,7 +4320,7 @@
           <a:buFontTx/>
           <a:buNone/>
           <a:tabLst/>
-          <a:defRPr b="0" baseline="0" cap="none" i="0" spc="0" strike="noStrike" sz="1800" u="none" kumimoji="0" normalizeH="0">
+          <a:defRPr kumimoji="0" sz="1800" b="0" i="0" u="none" strike="noStrike" cap="none" spc="0" normalizeH="0" baseline="0">
             <a:ln>
               <a:noFill/>
             </a:ln>
@@ -4221,7 +4346,7 @@
           <a:buFontTx/>
           <a:buNone/>
           <a:tabLst/>
-          <a:defRPr b="0" baseline="0" cap="none" i="0" spc="0" strike="noStrike" sz="1800" u="none" kumimoji="0" normalizeH="0">
+          <a:defRPr kumimoji="0" sz="1800" b="0" i="0" u="none" strike="noStrike" cap="none" spc="0" normalizeH="0" baseline="0">
             <a:ln>
               <a:noFill/>
             </a:ln>
@@ -4247,7 +4372,7 @@
           <a:buFontTx/>
           <a:buNone/>
           <a:tabLst/>
-          <a:defRPr b="0" baseline="0" cap="none" i="0" spc="0" strike="noStrike" sz="1800" u="none" kumimoji="0" normalizeH="0">
+          <a:defRPr kumimoji="0" sz="1800" b="0" i="0" u="none" strike="noStrike" cap="none" spc="0" normalizeH="0" baseline="0">
             <a:ln>
               <a:noFill/>
             </a:ln>
@@ -4273,7 +4398,7 @@
           <a:buFontTx/>
           <a:buNone/>
           <a:tabLst/>
-          <a:defRPr b="0" baseline="0" cap="none" i="0" spc="0" strike="noStrike" sz="1800" u="none" kumimoji="0" normalizeH="0">
+          <a:defRPr kumimoji="0" sz="1800" b="0" i="0" u="none" strike="noStrike" cap="none" spc="0" normalizeH="0" baseline="0">
             <a:ln>
               <a:noFill/>
             </a:ln>
@@ -4299,7 +4424,7 @@
           <a:buFontTx/>
           <a:buNone/>
           <a:tabLst/>
-          <a:defRPr b="0" baseline="0" cap="none" i="0" spc="0" strike="noStrike" sz="1800" u="none" kumimoji="0" normalizeH="0">
+          <a:defRPr kumimoji="0" sz="1800" b="0" i="0" u="none" strike="noStrike" cap="none" spc="0" normalizeH="0" baseline="0">
             <a:ln>
               <a:noFill/>
             </a:ln>
@@ -4325,7 +4450,7 @@
           <a:buFontTx/>
           <a:buNone/>
           <a:tabLst/>
-          <a:defRPr b="0" baseline="0" cap="none" i="0" spc="0" strike="noStrike" sz="1800" u="none" kumimoji="0" normalizeH="0">
+          <a:defRPr kumimoji="0" sz="1800" b="0" i="0" u="none" strike="noStrike" cap="none" spc="0" normalizeH="0" baseline="0">
             <a:ln>
               <a:noFill/>
             </a:ln>
@@ -4338,9 +4463,15 @@
         </a:lvl9pPr>
       </a:lstStyle>
       <a:style>
-        <a:lnRef idx="0"/>
-        <a:fillRef idx="0"/>
-        <a:effectRef idx="0"/>
+        <a:lnRef idx="0">
+          <a:scrgbClr r="0" g="0" b="0"/>
+        </a:lnRef>
+        <a:fillRef idx="0">
+          <a:scrgbClr r="0" g="0" b="0"/>
+        </a:fillRef>
+        <a:effectRef idx="0">
+          <a:scrgbClr r="0" g="0" b="0"/>
+        </a:effectRef>
         <a:fontRef idx="none"/>
       </a:style>
     </a:lnDef>
@@ -4354,7 +4485,7 @@
         <a:effectLst/>
         <a:sp3d/>
       </a:spPr>
-      <a:bodyPr rot="0" spcFirstLastPara="1" vertOverflow="overflow" horzOverflow="overflow" vert="horz" wrap="square" lIns="50800" tIns="50800" rIns="50800" bIns="50800" numCol="1" spcCol="38100" rtlCol="0" anchor="ctr" upright="0">
+      <a:bodyPr rot="0" spcFirstLastPara="1" vertOverflow="overflow" horzOverflow="overflow" vert="horz" wrap="square" lIns="50800" tIns="50800" rIns="50800" bIns="50800" numCol="1" spcCol="38100" rtlCol="0" anchor="ctr">
         <a:spAutoFit/>
       </a:bodyPr>
       <a:lstStyle>
@@ -4373,7 +4504,7 @@
           <a:buFontTx/>
           <a:buNone/>
           <a:tabLst/>
-          <a:defRPr b="1" baseline="0" cap="none" i="0" spc="0" strike="noStrike" sz="2400" u="none" kumimoji="0" normalizeH="0">
+          <a:defRPr kumimoji="0" sz="2400" b="1" i="0" u="none" strike="noStrike" cap="none" spc="0" normalizeH="0" baseline="0">
             <a:ln>
               <a:noFill/>
             </a:ln>
@@ -4403,7 +4534,7 @@
           <a:buFontTx/>
           <a:buNone/>
           <a:tabLst/>
-          <a:defRPr b="0" baseline="0" cap="none" i="0" spc="0" strike="noStrike" sz="1800" u="none" kumimoji="0" normalizeH="0">
+          <a:defRPr kumimoji="0" sz="1800" b="0" i="0" u="none" strike="noStrike" cap="none" spc="0" normalizeH="0" baseline="0">
             <a:ln>
               <a:noFill/>
             </a:ln>
@@ -4429,7 +4560,7 @@
           <a:buFontTx/>
           <a:buNone/>
           <a:tabLst/>
-          <a:defRPr b="0" baseline="0" cap="none" i="0" spc="0" strike="noStrike" sz="1800" u="none" kumimoji="0" normalizeH="0">
+          <a:defRPr kumimoji="0" sz="1800" b="0" i="0" u="none" strike="noStrike" cap="none" spc="0" normalizeH="0" baseline="0">
             <a:ln>
               <a:noFill/>
             </a:ln>
@@ -4455,7 +4586,7 @@
           <a:buFontTx/>
           <a:buNone/>
           <a:tabLst/>
-          <a:defRPr b="0" baseline="0" cap="none" i="0" spc="0" strike="noStrike" sz="1800" u="none" kumimoji="0" normalizeH="0">
+          <a:defRPr kumimoji="0" sz="1800" b="0" i="0" u="none" strike="noStrike" cap="none" spc="0" normalizeH="0" baseline="0">
             <a:ln>
               <a:noFill/>
             </a:ln>
@@ -4481,7 +4612,7 @@
           <a:buFontTx/>
           <a:buNone/>
           <a:tabLst/>
-          <a:defRPr b="0" baseline="0" cap="none" i="0" spc="0" strike="noStrike" sz="1800" u="none" kumimoji="0" normalizeH="0">
+          <a:defRPr kumimoji="0" sz="1800" b="0" i="0" u="none" strike="noStrike" cap="none" spc="0" normalizeH="0" baseline="0">
             <a:ln>
               <a:noFill/>
             </a:ln>
@@ -4507,7 +4638,7 @@
           <a:buFontTx/>
           <a:buNone/>
           <a:tabLst/>
-          <a:defRPr b="0" baseline="0" cap="none" i="0" spc="0" strike="noStrike" sz="1800" u="none" kumimoji="0" normalizeH="0">
+          <a:defRPr kumimoji="0" sz="1800" b="0" i="0" u="none" strike="noStrike" cap="none" spc="0" normalizeH="0" baseline="0">
             <a:ln>
               <a:noFill/>
             </a:ln>
@@ -4533,7 +4664,7 @@
           <a:buFontTx/>
           <a:buNone/>
           <a:tabLst/>
-          <a:defRPr b="0" baseline="0" cap="none" i="0" spc="0" strike="noStrike" sz="1800" u="none" kumimoji="0" normalizeH="0">
+          <a:defRPr kumimoji="0" sz="1800" b="0" i="0" u="none" strike="noStrike" cap="none" spc="0" normalizeH="0" baseline="0">
             <a:ln>
               <a:noFill/>
             </a:ln>
@@ -4559,7 +4690,7 @@
           <a:buFontTx/>
           <a:buNone/>
           <a:tabLst/>
-          <a:defRPr b="0" baseline="0" cap="none" i="0" spc="0" strike="noStrike" sz="1800" u="none" kumimoji="0" normalizeH="0">
+          <a:defRPr kumimoji="0" sz="1800" b="0" i="0" u="none" strike="noStrike" cap="none" spc="0" normalizeH="0" baseline="0">
             <a:ln>
               <a:noFill/>
             </a:ln>
@@ -4585,7 +4716,7 @@
           <a:buFontTx/>
           <a:buNone/>
           <a:tabLst/>
-          <a:defRPr b="0" baseline="0" cap="none" i="0" spc="0" strike="noStrike" sz="1800" u="none" kumimoji="0" normalizeH="0">
+          <a:defRPr kumimoji="0" sz="1800" b="0" i="0" u="none" strike="noStrike" cap="none" spc="0" normalizeH="0" baseline="0">
             <a:ln>
               <a:noFill/>
             </a:ln>
@@ -4611,7 +4742,7 @@
           <a:buFontTx/>
           <a:buNone/>
           <a:tabLst/>
-          <a:defRPr b="0" baseline="0" cap="none" i="0" spc="0" strike="noStrike" sz="1800" u="none" kumimoji="0" normalizeH="0">
+          <a:defRPr kumimoji="0" sz="1800" b="0" i="0" u="none" strike="noStrike" cap="none" spc="0" normalizeH="0" baseline="0">
             <a:ln>
               <a:noFill/>
             </a:ln>
@@ -4624,18 +4755,25 @@
         </a:lvl9pPr>
       </a:lstStyle>
       <a:style>
-        <a:lnRef idx="0"/>
-        <a:fillRef idx="0"/>
-        <a:effectRef idx="0"/>
+        <a:lnRef idx="0">
+          <a:scrgbClr r="0" g="0" b="0"/>
+        </a:lnRef>
+        <a:fillRef idx="0">
+          <a:scrgbClr r="0" g="0" b="0"/>
+        </a:fillRef>
+        <a:effectRef idx="0">
+          <a:scrgbClr r="0" g="0" b="0"/>
+        </a:effectRef>
         <a:fontRef idx="none"/>
       </a:style>
     </a:txDef>
   </a:objectDefaults>
+  <a:extraClrSchemeLst/>
 </a:theme>
 </file>
 
 <file path=ppt/theme/theme2.xml><?xml version="1.0" encoding="utf-8"?>
-<a:theme xmlns:a="http://schemas.openxmlformats.org/drawingml/2006/main" xmlns:r="http://schemas.openxmlformats.org/officeDocument/2006/relationships" name="White">
+<a:theme xmlns:a="http://schemas.openxmlformats.org/drawingml/2006/main" name="White">
   <a:themeElements>
     <a:clrScheme name="White">
       <a:dk1>
@@ -4834,7 +4972,7 @@
         <a:effectLst/>
         <a:sp3d/>
       </a:spPr>
-      <a:bodyPr rot="0" spcFirstLastPara="1" vertOverflow="overflow" horzOverflow="overflow" vert="horz" wrap="square" lIns="50800" tIns="50800" rIns="50800" bIns="50800" numCol="1" spcCol="38100" rtlCol="0" anchor="ctr" upright="0">
+      <a:bodyPr rot="0" spcFirstLastPara="1" vertOverflow="overflow" horzOverflow="overflow" vert="horz" wrap="square" lIns="50800" tIns="50800" rIns="50800" bIns="50800" numCol="1" spcCol="38100" rtlCol="0" anchor="ctr">
         <a:spAutoFit/>
       </a:bodyPr>
       <a:lstStyle>
@@ -4853,7 +4991,7 @@
           <a:buFontTx/>
           <a:buNone/>
           <a:tabLst/>
-          <a:defRPr b="0" baseline="0" cap="none" i="0" spc="0" strike="noStrike" sz="2200" u="none" kumimoji="0" normalizeH="0">
+          <a:defRPr kumimoji="0" sz="2200" b="0" i="0" u="none" strike="noStrike" cap="none" spc="0" normalizeH="0" baseline="0">
             <a:ln>
               <a:noFill/>
             </a:ln>
@@ -4883,7 +5021,7 @@
           <a:buFontTx/>
           <a:buNone/>
           <a:tabLst/>
-          <a:defRPr b="0" baseline="0" cap="none" i="0" spc="0" strike="noStrike" sz="1800" u="none" kumimoji="0" normalizeH="0">
+          <a:defRPr kumimoji="0" sz="1800" b="0" i="0" u="none" strike="noStrike" cap="none" spc="0" normalizeH="0" baseline="0">
             <a:ln>
               <a:noFill/>
             </a:ln>
@@ -4909,7 +5047,7 @@
           <a:buFontTx/>
           <a:buNone/>
           <a:tabLst/>
-          <a:defRPr b="0" baseline="0" cap="none" i="0" spc="0" strike="noStrike" sz="1800" u="none" kumimoji="0" normalizeH="0">
+          <a:defRPr kumimoji="0" sz="1800" b="0" i="0" u="none" strike="noStrike" cap="none" spc="0" normalizeH="0" baseline="0">
             <a:ln>
               <a:noFill/>
             </a:ln>
@@ -4935,7 +5073,7 @@
           <a:buFontTx/>
           <a:buNone/>
           <a:tabLst/>
-          <a:defRPr b="0" baseline="0" cap="none" i="0" spc="0" strike="noStrike" sz="1800" u="none" kumimoji="0" normalizeH="0">
+          <a:defRPr kumimoji="0" sz="1800" b="0" i="0" u="none" strike="noStrike" cap="none" spc="0" normalizeH="0" baseline="0">
             <a:ln>
               <a:noFill/>
             </a:ln>
@@ -4961,7 +5099,7 @@
           <a:buFontTx/>
           <a:buNone/>
           <a:tabLst/>
-          <a:defRPr b="0" baseline="0" cap="none" i="0" spc="0" strike="noStrike" sz="1800" u="none" kumimoji="0" normalizeH="0">
+          <a:defRPr kumimoji="0" sz="1800" b="0" i="0" u="none" strike="noStrike" cap="none" spc="0" normalizeH="0" baseline="0">
             <a:ln>
               <a:noFill/>
             </a:ln>
@@ -4987,7 +5125,7 @@
           <a:buFontTx/>
           <a:buNone/>
           <a:tabLst/>
-          <a:defRPr b="0" baseline="0" cap="none" i="0" spc="0" strike="noStrike" sz="1800" u="none" kumimoji="0" normalizeH="0">
+          <a:defRPr kumimoji="0" sz="1800" b="0" i="0" u="none" strike="noStrike" cap="none" spc="0" normalizeH="0" baseline="0">
             <a:ln>
               <a:noFill/>
             </a:ln>
@@ -5013,7 +5151,7 @@
           <a:buFontTx/>
           <a:buNone/>
           <a:tabLst/>
-          <a:defRPr b="0" baseline="0" cap="none" i="0" spc="0" strike="noStrike" sz="1800" u="none" kumimoji="0" normalizeH="0">
+          <a:defRPr kumimoji="0" sz="1800" b="0" i="0" u="none" strike="noStrike" cap="none" spc="0" normalizeH="0" baseline="0">
             <a:ln>
               <a:noFill/>
             </a:ln>
@@ -5039,7 +5177,7 @@
           <a:buFontTx/>
           <a:buNone/>
           <a:tabLst/>
-          <a:defRPr b="0" baseline="0" cap="none" i="0" spc="0" strike="noStrike" sz="1800" u="none" kumimoji="0" normalizeH="0">
+          <a:defRPr kumimoji="0" sz="1800" b="0" i="0" u="none" strike="noStrike" cap="none" spc="0" normalizeH="0" baseline="0">
             <a:ln>
               <a:noFill/>
             </a:ln>
@@ -5065,7 +5203,7 @@
           <a:buFontTx/>
           <a:buNone/>
           <a:tabLst/>
-          <a:defRPr b="0" baseline="0" cap="none" i="0" spc="0" strike="noStrike" sz="1800" u="none" kumimoji="0" normalizeH="0">
+          <a:defRPr kumimoji="0" sz="1800" b="0" i="0" u="none" strike="noStrike" cap="none" spc="0" normalizeH="0" baseline="0">
             <a:ln>
               <a:noFill/>
             </a:ln>
@@ -5091,7 +5229,7 @@
           <a:buFontTx/>
           <a:buNone/>
           <a:tabLst/>
-          <a:defRPr b="0" baseline="0" cap="none" i="0" spc="0" strike="noStrike" sz="1800" u="none" kumimoji="0" normalizeH="0">
+          <a:defRPr kumimoji="0" sz="1800" b="0" i="0" u="none" strike="noStrike" cap="none" spc="0" normalizeH="0" baseline="0">
             <a:ln>
               <a:noFill/>
             </a:ln>
@@ -5104,9 +5242,15 @@
         </a:lvl9pPr>
       </a:lstStyle>
       <a:style>
-        <a:lnRef idx="0"/>
-        <a:fillRef idx="0"/>
-        <a:effectRef idx="0"/>
+        <a:lnRef idx="0">
+          <a:scrgbClr r="0" g="0" b="0"/>
+        </a:lnRef>
+        <a:fillRef idx="0">
+          <a:scrgbClr r="0" g="0" b="0"/>
+        </a:fillRef>
+        <a:effectRef idx="0">
+          <a:scrgbClr r="0" g="0" b="0"/>
+        </a:effectRef>
         <a:fontRef idx="none"/>
       </a:style>
     </a:spDef>
@@ -5123,7 +5267,7 @@
         <a:effectLst/>
         <a:sp3d/>
       </a:spPr>
-      <a:bodyPr rot="0" spcFirstLastPara="1" vertOverflow="overflow" horzOverflow="overflow" vert="horz" wrap="square" lIns="91439" tIns="45719" rIns="91439" bIns="45719" numCol="1" spcCol="38100" rtlCol="0" anchor="t" upright="0">
+      <a:bodyPr rot="0" spcFirstLastPara="1" vertOverflow="overflow" horzOverflow="overflow" vert="horz" wrap="square" lIns="91439" tIns="45719" rIns="91439" bIns="45719" numCol="1" spcCol="38100" rtlCol="0" anchor="t">
         <a:noAutofit/>
       </a:bodyPr>
       <a:lstStyle>
@@ -5142,7 +5286,7 @@
           <a:buFontTx/>
           <a:buNone/>
           <a:tabLst/>
-          <a:defRPr b="0" baseline="0" cap="none" i="0" spc="0" strike="noStrike" sz="1800" u="none" kumimoji="0" normalizeH="0">
+          <a:defRPr kumimoji="0" sz="1800" b="0" i="0" u="none" strike="noStrike" cap="none" spc="0" normalizeH="0" baseline="0">
             <a:ln>
               <a:noFill/>
             </a:ln>
@@ -5168,7 +5312,7 @@
           <a:buFontTx/>
           <a:buNone/>
           <a:tabLst/>
-          <a:defRPr b="0" baseline="0" cap="none" i="0" spc="0" strike="noStrike" sz="1800" u="none" kumimoji="0" normalizeH="0">
+          <a:defRPr kumimoji="0" sz="1800" b="0" i="0" u="none" strike="noStrike" cap="none" spc="0" normalizeH="0" baseline="0">
             <a:ln>
               <a:noFill/>
             </a:ln>
@@ -5194,7 +5338,7 @@
           <a:buFontTx/>
           <a:buNone/>
           <a:tabLst/>
-          <a:defRPr b="0" baseline="0" cap="none" i="0" spc="0" strike="noStrike" sz="1800" u="none" kumimoji="0" normalizeH="0">
+          <a:defRPr kumimoji="0" sz="1800" b="0" i="0" u="none" strike="noStrike" cap="none" spc="0" normalizeH="0" baseline="0">
             <a:ln>
               <a:noFill/>
             </a:ln>
@@ -5220,7 +5364,7 @@
           <a:buFontTx/>
           <a:buNone/>
           <a:tabLst/>
-          <a:defRPr b="0" baseline="0" cap="none" i="0" spc="0" strike="noStrike" sz="1800" u="none" kumimoji="0" normalizeH="0">
+          <a:defRPr kumimoji="0" sz="1800" b="0" i="0" u="none" strike="noStrike" cap="none" spc="0" normalizeH="0" baseline="0">
             <a:ln>
               <a:noFill/>
             </a:ln>
@@ -5246,7 +5390,7 @@
           <a:buFontTx/>
           <a:buNone/>
           <a:tabLst/>
-          <a:defRPr b="0" baseline="0" cap="none" i="0" spc="0" strike="noStrike" sz="1800" u="none" kumimoji="0" normalizeH="0">
+          <a:defRPr kumimoji="0" sz="1800" b="0" i="0" u="none" strike="noStrike" cap="none" spc="0" normalizeH="0" baseline="0">
             <a:ln>
               <a:noFill/>
             </a:ln>
@@ -5272,7 +5416,7 @@
           <a:buFontTx/>
           <a:buNone/>
           <a:tabLst/>
-          <a:defRPr b="0" baseline="0" cap="none" i="0" spc="0" strike="noStrike" sz="1800" u="none" kumimoji="0" normalizeH="0">
+          <a:defRPr kumimoji="0" sz="1800" b="0" i="0" u="none" strike="noStrike" cap="none" spc="0" normalizeH="0" baseline="0">
             <a:ln>
               <a:noFill/>
             </a:ln>
@@ -5298,7 +5442,7 @@
           <a:buFontTx/>
           <a:buNone/>
           <a:tabLst/>
-          <a:defRPr b="0" baseline="0" cap="none" i="0" spc="0" strike="noStrike" sz="1800" u="none" kumimoji="0" normalizeH="0">
+          <a:defRPr kumimoji="0" sz="1800" b="0" i="0" u="none" strike="noStrike" cap="none" spc="0" normalizeH="0" baseline="0">
             <a:ln>
               <a:noFill/>
             </a:ln>
@@ -5324,7 +5468,7 @@
           <a:buFontTx/>
           <a:buNone/>
           <a:tabLst/>
-          <a:defRPr b="0" baseline="0" cap="none" i="0" spc="0" strike="noStrike" sz="1800" u="none" kumimoji="0" normalizeH="0">
+          <a:defRPr kumimoji="0" sz="1800" b="0" i="0" u="none" strike="noStrike" cap="none" spc="0" normalizeH="0" baseline="0">
             <a:ln>
               <a:noFill/>
             </a:ln>
@@ -5350,7 +5494,7 @@
           <a:buFontTx/>
           <a:buNone/>
           <a:tabLst/>
-          <a:defRPr b="0" baseline="0" cap="none" i="0" spc="0" strike="noStrike" sz="1800" u="none" kumimoji="0" normalizeH="0">
+          <a:defRPr kumimoji="0" sz="1800" b="0" i="0" u="none" strike="noStrike" cap="none" spc="0" normalizeH="0" baseline="0">
             <a:ln>
               <a:noFill/>
             </a:ln>
@@ -5376,7 +5520,7 @@
           <a:buFontTx/>
           <a:buNone/>
           <a:tabLst/>
-          <a:defRPr b="0" baseline="0" cap="none" i="0" spc="0" strike="noStrike" sz="1800" u="none" kumimoji="0" normalizeH="0">
+          <a:defRPr kumimoji="0" sz="1800" b="0" i="0" u="none" strike="noStrike" cap="none" spc="0" normalizeH="0" baseline="0">
             <a:ln>
               <a:noFill/>
             </a:ln>
@@ -5389,9 +5533,15 @@
         </a:lvl9pPr>
       </a:lstStyle>
       <a:style>
-        <a:lnRef idx="0"/>
-        <a:fillRef idx="0"/>
-        <a:effectRef idx="0"/>
+        <a:lnRef idx="0">
+          <a:scrgbClr r="0" g="0" b="0"/>
+        </a:lnRef>
+        <a:fillRef idx="0">
+          <a:scrgbClr r="0" g="0" b="0"/>
+        </a:fillRef>
+        <a:effectRef idx="0">
+          <a:scrgbClr r="0" g="0" b="0"/>
+        </a:effectRef>
         <a:fontRef idx="none"/>
       </a:style>
     </a:lnDef>
@@ -5405,7 +5555,7 @@
         <a:effectLst/>
         <a:sp3d/>
       </a:spPr>
-      <a:bodyPr rot="0" spcFirstLastPara="1" vertOverflow="overflow" horzOverflow="overflow" vert="horz" wrap="square" lIns="50800" tIns="50800" rIns="50800" bIns="50800" numCol="1" spcCol="38100" rtlCol="0" anchor="ctr" upright="0">
+      <a:bodyPr rot="0" spcFirstLastPara="1" vertOverflow="overflow" horzOverflow="overflow" vert="horz" wrap="square" lIns="50800" tIns="50800" rIns="50800" bIns="50800" numCol="1" spcCol="38100" rtlCol="0" anchor="ctr">
         <a:spAutoFit/>
       </a:bodyPr>
       <a:lstStyle>
@@ -5424,7 +5574,7 @@
           <a:buFontTx/>
           <a:buNone/>
           <a:tabLst/>
-          <a:defRPr b="1" baseline="0" cap="none" i="0" spc="0" strike="noStrike" sz="2400" u="none" kumimoji="0" normalizeH="0">
+          <a:defRPr kumimoji="0" sz="2400" b="1" i="0" u="none" strike="noStrike" cap="none" spc="0" normalizeH="0" baseline="0">
             <a:ln>
               <a:noFill/>
             </a:ln>
@@ -5454,7 +5604,7 @@
           <a:buFontTx/>
           <a:buNone/>
           <a:tabLst/>
-          <a:defRPr b="0" baseline="0" cap="none" i="0" spc="0" strike="noStrike" sz="1800" u="none" kumimoji="0" normalizeH="0">
+          <a:defRPr kumimoji="0" sz="1800" b="0" i="0" u="none" strike="noStrike" cap="none" spc="0" normalizeH="0" baseline="0">
             <a:ln>
               <a:noFill/>
             </a:ln>
@@ -5480,7 +5630,7 @@
           <a:buFontTx/>
           <a:buNone/>
           <a:tabLst/>
-          <a:defRPr b="0" baseline="0" cap="none" i="0" spc="0" strike="noStrike" sz="1800" u="none" kumimoji="0" normalizeH="0">
+          <a:defRPr kumimoji="0" sz="1800" b="0" i="0" u="none" strike="noStrike" cap="none" spc="0" normalizeH="0" baseline="0">
             <a:ln>
               <a:noFill/>
             </a:ln>
@@ -5506,7 +5656,7 @@
           <a:buFontTx/>
           <a:buNone/>
           <a:tabLst/>
-          <a:defRPr b="0" baseline="0" cap="none" i="0" spc="0" strike="noStrike" sz="1800" u="none" kumimoji="0" normalizeH="0">
+          <a:defRPr kumimoji="0" sz="1800" b="0" i="0" u="none" strike="noStrike" cap="none" spc="0" normalizeH="0" baseline="0">
             <a:ln>
               <a:noFill/>
             </a:ln>
@@ -5532,7 +5682,7 @@
           <a:buFontTx/>
           <a:buNone/>
           <a:tabLst/>
-          <a:defRPr b="0" baseline="0" cap="none" i="0" spc="0" strike="noStrike" sz="1800" u="none" kumimoji="0" normalizeH="0">
+          <a:defRPr kumimoji="0" sz="1800" b="0" i="0" u="none" strike="noStrike" cap="none" spc="0" normalizeH="0" baseline="0">
             <a:ln>
               <a:noFill/>
             </a:ln>
@@ -5558,7 +5708,7 @@
           <a:buFontTx/>
           <a:buNone/>
           <a:tabLst/>
-          <a:defRPr b="0" baseline="0" cap="none" i="0" spc="0" strike="noStrike" sz="1800" u="none" kumimoji="0" normalizeH="0">
+          <a:defRPr kumimoji="0" sz="1800" b="0" i="0" u="none" strike="noStrike" cap="none" spc="0" normalizeH="0" baseline="0">
             <a:ln>
               <a:noFill/>
             </a:ln>
@@ -5584,7 +5734,7 @@
           <a:buFontTx/>
           <a:buNone/>
           <a:tabLst/>
-          <a:defRPr b="0" baseline="0" cap="none" i="0" spc="0" strike="noStrike" sz="1800" u="none" kumimoji="0" normalizeH="0">
+          <a:defRPr kumimoji="0" sz="1800" b="0" i="0" u="none" strike="noStrike" cap="none" spc="0" normalizeH="0" baseline="0">
             <a:ln>
               <a:noFill/>
             </a:ln>
@@ -5610,7 +5760,7 @@
           <a:buFontTx/>
           <a:buNone/>
           <a:tabLst/>
-          <a:defRPr b="0" baseline="0" cap="none" i="0" spc="0" strike="noStrike" sz="1800" u="none" kumimoji="0" normalizeH="0">
+          <a:defRPr kumimoji="0" sz="1800" b="0" i="0" u="none" strike="noStrike" cap="none" spc="0" normalizeH="0" baseline="0">
             <a:ln>
               <a:noFill/>
             </a:ln>
@@ -5636,7 +5786,7 @@
           <a:buFontTx/>
           <a:buNone/>
           <a:tabLst/>
-          <a:defRPr b="0" baseline="0" cap="none" i="0" spc="0" strike="noStrike" sz="1800" u="none" kumimoji="0" normalizeH="0">
+          <a:defRPr kumimoji="0" sz="1800" b="0" i="0" u="none" strike="noStrike" cap="none" spc="0" normalizeH="0" baseline="0">
             <a:ln>
               <a:noFill/>
             </a:ln>
@@ -5662,7 +5812,7 @@
           <a:buFontTx/>
           <a:buNone/>
           <a:tabLst/>
-          <a:defRPr b="0" baseline="0" cap="none" i="0" spc="0" strike="noStrike" sz="1800" u="none" kumimoji="0" normalizeH="0">
+          <a:defRPr kumimoji="0" sz="1800" b="0" i="0" u="none" strike="noStrike" cap="none" spc="0" normalizeH="0" baseline="0">
             <a:ln>
               <a:noFill/>
             </a:ln>
@@ -5675,12 +5825,19 @@
         </a:lvl9pPr>
       </a:lstStyle>
       <a:style>
-        <a:lnRef idx="0"/>
-        <a:fillRef idx="0"/>
-        <a:effectRef idx="0"/>
+        <a:lnRef idx="0">
+          <a:scrgbClr r="0" g="0" b="0"/>
+        </a:lnRef>
+        <a:fillRef idx="0">
+          <a:scrgbClr r="0" g="0" b="0"/>
+        </a:fillRef>
+        <a:effectRef idx="0">
+          <a:scrgbClr r="0" g="0" b="0"/>
+        </a:effectRef>
         <a:fontRef idx="none"/>
       </a:style>
     </a:txDef>
   </a:objectDefaults>
+  <a:extraClrSchemeLst/>
 </a:theme>
 </file>
</xml_diff>